<commit_message>
Add information to powerpoint and add link to online powerpoint copy
</commit_message>
<xml_diff>
--- a/Nullability and Pattern Matching.pptx
+++ b/Nullability and Pattern Matching.pptx
@@ -6,7 +6,17 @@
   </p:sldMasterIdLst>
   <p:sldIdLst>
     <p:sldId id="256" r:id="rId2"/>
-    <p:sldId id="257" r:id="rId3"/>
+    <p:sldId id="260" r:id="rId3"/>
+    <p:sldId id="258" r:id="rId4"/>
+    <p:sldId id="263" r:id="rId5"/>
+    <p:sldId id="259" r:id="rId6"/>
+    <p:sldId id="264" r:id="rId7"/>
+    <p:sldId id="257" r:id="rId8"/>
+    <p:sldId id="262" r:id="rId9"/>
+    <p:sldId id="261" r:id="rId10"/>
+    <p:sldId id="265" r:id="rId11"/>
+    <p:sldId id="266" r:id="rId12"/>
+    <p:sldId id="267" r:id="rId13"/>
   </p:sldIdLst>
   <p:sldSz cx="12192000" cy="6858000"/>
   <p:notesSz cx="6858000" cy="9144000"/>
@@ -105,11 +115,293 @@
       </a:defRPr>
     </a:lvl9pPr>
   </p:defaultTextStyle>
+  <p:extLst>
+    <p:ext uri="{EFAFB233-063F-42B5-8137-9DF3F51BA10A}">
+      <p15:sldGuideLst xmlns:p15="http://schemas.microsoft.com/office/powerpoint/2012/main"/>
+    </p:ext>
+  </p:extLst>
 </p:presentation>
+</file>
+
+<file path=ppt/revisionInfo.xml><?xml version="1.0" encoding="utf-8"?>
+<p1510:revInfo xmlns:a="http://schemas.openxmlformats.org/drawingml/2006/main" xmlns:r="http://schemas.openxmlformats.org/officeDocument/2006/relationships" xmlns:p1510="http://schemas.microsoft.com/office/powerpoint/2015/10/main">
+  <p1510:revLst>
+    <p1510:client id="{E9C26C98-DF0A-41A1-9F8C-982CDF906D42}" v="14" dt="2021-03-27T05:20:52.969"/>
+  </p1510:revLst>
+</p1510:revInfo>
 </file>
 
 <file path=ppt/changesInfos/changesInfo1.xml><?xml version="1.0" encoding="utf-8"?>
 <pc:chgInfo xmlns:a="http://schemas.openxmlformats.org/drawingml/2006/main" xmlns:r="http://schemas.openxmlformats.org/officeDocument/2006/relationships" xmlns:ac="http://schemas.microsoft.com/office/drawing/2013/main/command" xmlns:pc="http://schemas.microsoft.com/office/powerpoint/2013/main/command">
+  <pc:docChgLst>
+    <pc:chgData name="Benjamin Michaelis" userId="047d050af9d747a3" providerId="LiveId" clId="{E9C26C98-DF0A-41A1-9F8C-982CDF906D42}"/>
+    <pc:docChg chg="undo custSel addSld delSld modSld">
+      <pc:chgData name="Benjamin Michaelis" userId="047d050af9d747a3" providerId="LiveId" clId="{E9C26C98-DF0A-41A1-9F8C-982CDF906D42}" dt="2021-03-27T06:04:10.747" v="1582" actId="20577"/>
+      <pc:docMkLst>
+        <pc:docMk/>
+      </pc:docMkLst>
+      <pc:sldChg chg="addSp delSp modSp mod">
+        <pc:chgData name="Benjamin Michaelis" userId="047d050af9d747a3" providerId="LiveId" clId="{E9C26C98-DF0A-41A1-9F8C-982CDF906D42}" dt="2021-03-27T05:32:17.086" v="1310" actId="20577"/>
+        <pc:sldMkLst>
+          <pc:docMk/>
+          <pc:sldMk cId="3268341817" sldId="257"/>
+        </pc:sldMkLst>
+        <pc:spChg chg="mod">
+          <ac:chgData name="Benjamin Michaelis" userId="047d050af9d747a3" providerId="LiveId" clId="{E9C26C98-DF0A-41A1-9F8C-982CDF906D42}" dt="2021-03-27T05:14:42.510" v="627" actId="20577"/>
+          <ac:spMkLst>
+            <pc:docMk/>
+            <pc:sldMk cId="3268341817" sldId="257"/>
+            <ac:spMk id="2" creationId="{8E2484BB-30AE-49CF-B13F-24A81AC46484}"/>
+          </ac:spMkLst>
+        </pc:spChg>
+        <pc:spChg chg="mod">
+          <ac:chgData name="Benjamin Michaelis" userId="047d050af9d747a3" providerId="LiveId" clId="{E9C26C98-DF0A-41A1-9F8C-982CDF906D42}" dt="2021-03-27T05:32:17.086" v="1310" actId="20577"/>
+          <ac:spMkLst>
+            <pc:docMk/>
+            <pc:sldMk cId="3268341817" sldId="257"/>
+            <ac:spMk id="3" creationId="{5E6087FD-A9F0-437C-982C-0DE663F327A0}"/>
+          </ac:spMkLst>
+        </pc:spChg>
+        <pc:spChg chg="add del">
+          <ac:chgData name="Benjamin Michaelis" userId="047d050af9d747a3" providerId="LiveId" clId="{E9C26C98-DF0A-41A1-9F8C-982CDF906D42}" dt="2021-03-27T05:10:32.946" v="394"/>
+          <ac:spMkLst>
+            <pc:docMk/>
+            <pc:sldMk cId="3268341817" sldId="257"/>
+            <ac:spMk id="4" creationId="{EB4F4167-07B2-49AD-B863-46194BF281B2}"/>
+          </ac:spMkLst>
+        </pc:spChg>
+      </pc:sldChg>
+      <pc:sldChg chg="addSp delSp modSp new mod">
+        <pc:chgData name="Benjamin Michaelis" userId="047d050af9d747a3" providerId="LiveId" clId="{E9C26C98-DF0A-41A1-9F8C-982CDF906D42}" dt="2021-03-27T05:53:39.284" v="1395" actId="20577"/>
+        <pc:sldMkLst>
+          <pc:docMk/>
+          <pc:sldMk cId="2235926313" sldId="258"/>
+        </pc:sldMkLst>
+        <pc:spChg chg="mod">
+          <ac:chgData name="Benjamin Michaelis" userId="047d050af9d747a3" providerId="LiveId" clId="{E9C26C98-DF0A-41A1-9F8C-982CDF906D42}" dt="2021-03-27T05:12:30.092" v="477" actId="20577"/>
+          <ac:spMkLst>
+            <pc:docMk/>
+            <pc:sldMk cId="2235926313" sldId="258"/>
+            <ac:spMk id="2" creationId="{A0BD10A4-536C-4567-A84B-A1BC866664C1}"/>
+          </ac:spMkLst>
+        </pc:spChg>
+        <pc:spChg chg="mod">
+          <ac:chgData name="Benjamin Michaelis" userId="047d050af9d747a3" providerId="LiveId" clId="{E9C26C98-DF0A-41A1-9F8C-982CDF906D42}" dt="2021-03-27T05:53:39.284" v="1395" actId="20577"/>
+          <ac:spMkLst>
+            <pc:docMk/>
+            <pc:sldMk cId="2235926313" sldId="258"/>
+            <ac:spMk id="3" creationId="{A6310C60-4DBF-458F-8A5B-A162E7FB33A8}"/>
+          </ac:spMkLst>
+        </pc:spChg>
+        <pc:spChg chg="add del">
+          <ac:chgData name="Benjamin Michaelis" userId="047d050af9d747a3" providerId="LiveId" clId="{E9C26C98-DF0A-41A1-9F8C-982CDF906D42}" dt="2021-03-27T05:04:45.164" v="228"/>
+          <ac:spMkLst>
+            <pc:docMk/>
+            <pc:sldMk cId="2235926313" sldId="258"/>
+            <ac:spMk id="4" creationId="{9CCC75BD-491F-4F90-81AC-D740BE5E1A76}"/>
+          </ac:spMkLst>
+        </pc:spChg>
+        <pc:spChg chg="add del">
+          <ac:chgData name="Benjamin Michaelis" userId="047d050af9d747a3" providerId="LiveId" clId="{E9C26C98-DF0A-41A1-9F8C-982CDF906D42}" dt="2021-03-27T05:04:47.695" v="230"/>
+          <ac:spMkLst>
+            <pc:docMk/>
+            <pc:sldMk cId="2235926313" sldId="258"/>
+            <ac:spMk id="5" creationId="{B948115D-1323-4E51-A13B-F186FAB1EEE5}"/>
+          </ac:spMkLst>
+        </pc:spChg>
+      </pc:sldChg>
+      <pc:sldChg chg="modSp new mod">
+        <pc:chgData name="Benjamin Michaelis" userId="047d050af9d747a3" providerId="LiveId" clId="{E9C26C98-DF0A-41A1-9F8C-982CDF906D42}" dt="2021-03-27T05:56:28.492" v="1461" actId="21"/>
+        <pc:sldMkLst>
+          <pc:docMk/>
+          <pc:sldMk cId="1761299376" sldId="259"/>
+        </pc:sldMkLst>
+        <pc:spChg chg="mod">
+          <ac:chgData name="Benjamin Michaelis" userId="047d050af9d747a3" providerId="LiveId" clId="{E9C26C98-DF0A-41A1-9F8C-982CDF906D42}" dt="2021-03-27T05:12:26.303" v="476" actId="20577"/>
+          <ac:spMkLst>
+            <pc:docMk/>
+            <pc:sldMk cId="1761299376" sldId="259"/>
+            <ac:spMk id="2" creationId="{7833FD6B-B85A-40C6-987E-2A7C562E0DFB}"/>
+          </ac:spMkLst>
+        </pc:spChg>
+        <pc:spChg chg="mod">
+          <ac:chgData name="Benjamin Michaelis" userId="047d050af9d747a3" providerId="LiveId" clId="{E9C26C98-DF0A-41A1-9F8C-982CDF906D42}" dt="2021-03-27T05:56:28.492" v="1461" actId="21"/>
+          <ac:spMkLst>
+            <pc:docMk/>
+            <pc:sldMk cId="1761299376" sldId="259"/>
+            <ac:spMk id="3" creationId="{8D63D492-7BE7-4E60-B0C3-BD370D7C66BD}"/>
+          </ac:spMkLst>
+        </pc:spChg>
+      </pc:sldChg>
+      <pc:sldChg chg="modSp new del mod">
+        <pc:chgData name="Benjamin Michaelis" userId="047d050af9d747a3" providerId="LiveId" clId="{E9C26C98-DF0A-41A1-9F8C-982CDF906D42}" dt="2021-03-27T05:17:31.210" v="678" actId="47"/>
+        <pc:sldMkLst>
+          <pc:docMk/>
+          <pc:sldMk cId="2502764520" sldId="260"/>
+        </pc:sldMkLst>
+        <pc:spChg chg="mod">
+          <ac:chgData name="Benjamin Michaelis" userId="047d050af9d747a3" providerId="LiveId" clId="{E9C26C98-DF0A-41A1-9F8C-982CDF906D42}" dt="2021-03-27T05:17:29.579" v="677" actId="20577"/>
+          <ac:spMkLst>
+            <pc:docMk/>
+            <pc:sldMk cId="2502764520" sldId="260"/>
+            <ac:spMk id="2" creationId="{9FFE4798-FC2B-4749-8BB6-0CDF6CEFC08A}"/>
+          </ac:spMkLst>
+        </pc:spChg>
+      </pc:sldChg>
+      <pc:sldChg chg="modSp new mod">
+        <pc:chgData name="Benjamin Michaelis" userId="047d050af9d747a3" providerId="LiveId" clId="{E9C26C98-DF0A-41A1-9F8C-982CDF906D42}" dt="2021-03-27T05:30:04.615" v="1285" actId="403"/>
+        <pc:sldMkLst>
+          <pc:docMk/>
+          <pc:sldMk cId="2953954537" sldId="260"/>
+        </pc:sldMkLst>
+        <pc:spChg chg="mod">
+          <ac:chgData name="Benjamin Michaelis" userId="047d050af9d747a3" providerId="LiveId" clId="{E9C26C98-DF0A-41A1-9F8C-982CDF906D42}" dt="2021-03-27T05:17:43.606" v="725" actId="20577"/>
+          <ac:spMkLst>
+            <pc:docMk/>
+            <pc:sldMk cId="2953954537" sldId="260"/>
+            <ac:spMk id="2" creationId="{2A7125D5-E513-4965-ABD8-20A16F4EF4AD}"/>
+          </ac:spMkLst>
+        </pc:spChg>
+        <pc:spChg chg="mod">
+          <ac:chgData name="Benjamin Michaelis" userId="047d050af9d747a3" providerId="LiveId" clId="{E9C26C98-DF0A-41A1-9F8C-982CDF906D42}" dt="2021-03-27T05:30:04.615" v="1285" actId="403"/>
+          <ac:spMkLst>
+            <pc:docMk/>
+            <pc:sldMk cId="2953954537" sldId="260"/>
+            <ac:spMk id="3" creationId="{B85D6BFC-0B1C-4DF5-918C-631E141B4ABC}"/>
+          </ac:spMkLst>
+        </pc:spChg>
+      </pc:sldChg>
+      <pc:sldChg chg="modSp add mod">
+        <pc:chgData name="Benjamin Michaelis" userId="047d050af9d747a3" providerId="LiveId" clId="{E9C26C98-DF0A-41A1-9F8C-982CDF906D42}" dt="2021-03-27T05:24:16.708" v="1086" actId="403"/>
+        <pc:sldMkLst>
+          <pc:docMk/>
+          <pc:sldMk cId="186704419" sldId="261"/>
+        </pc:sldMkLst>
+        <pc:spChg chg="mod">
+          <ac:chgData name="Benjamin Michaelis" userId="047d050af9d747a3" providerId="LiveId" clId="{E9C26C98-DF0A-41A1-9F8C-982CDF906D42}" dt="2021-03-27T05:24:16.708" v="1086" actId="403"/>
+          <ac:spMkLst>
+            <pc:docMk/>
+            <pc:sldMk cId="186704419" sldId="261"/>
+            <ac:spMk id="3" creationId="{5E6087FD-A9F0-437C-982C-0DE663F327A0}"/>
+          </ac:spMkLst>
+        </pc:spChg>
+      </pc:sldChg>
+      <pc:sldChg chg="modSp add mod">
+        <pc:chgData name="Benjamin Michaelis" userId="047d050af9d747a3" providerId="LiveId" clId="{E9C26C98-DF0A-41A1-9F8C-982CDF906D42}" dt="2021-03-27T05:28:13.248" v="1272"/>
+        <pc:sldMkLst>
+          <pc:docMk/>
+          <pc:sldMk cId="2739618691" sldId="262"/>
+        </pc:sldMkLst>
+        <pc:spChg chg="mod">
+          <ac:chgData name="Benjamin Michaelis" userId="047d050af9d747a3" providerId="LiveId" clId="{E9C26C98-DF0A-41A1-9F8C-982CDF906D42}" dt="2021-03-27T05:28:13.248" v="1272"/>
+          <ac:spMkLst>
+            <pc:docMk/>
+            <pc:sldMk cId="2739618691" sldId="262"/>
+            <ac:spMk id="3" creationId="{5E6087FD-A9F0-437C-982C-0DE663F327A0}"/>
+          </ac:spMkLst>
+        </pc:spChg>
+      </pc:sldChg>
+      <pc:sldChg chg="modSp add mod">
+        <pc:chgData name="Benjamin Michaelis" userId="047d050af9d747a3" providerId="LiveId" clId="{E9C26C98-DF0A-41A1-9F8C-982CDF906D42}" dt="2021-03-27T05:56:13.016" v="1460" actId="20577"/>
+        <pc:sldMkLst>
+          <pc:docMk/>
+          <pc:sldMk cId="2681204170" sldId="263"/>
+        </pc:sldMkLst>
+        <pc:spChg chg="mod">
+          <ac:chgData name="Benjamin Michaelis" userId="047d050af9d747a3" providerId="LiveId" clId="{E9C26C98-DF0A-41A1-9F8C-982CDF906D42}" dt="2021-03-27T05:52:01.867" v="1340" actId="20577"/>
+          <ac:spMkLst>
+            <pc:docMk/>
+            <pc:sldMk cId="2681204170" sldId="263"/>
+            <ac:spMk id="2" creationId="{A0BD10A4-536C-4567-A84B-A1BC866664C1}"/>
+          </ac:spMkLst>
+        </pc:spChg>
+        <pc:spChg chg="mod">
+          <ac:chgData name="Benjamin Michaelis" userId="047d050af9d747a3" providerId="LiveId" clId="{E9C26C98-DF0A-41A1-9F8C-982CDF906D42}" dt="2021-03-27T05:56:13.016" v="1460" actId="20577"/>
+          <ac:spMkLst>
+            <pc:docMk/>
+            <pc:sldMk cId="2681204170" sldId="263"/>
+            <ac:spMk id="3" creationId="{A6310C60-4DBF-458F-8A5B-A162E7FB33A8}"/>
+          </ac:spMkLst>
+        </pc:spChg>
+      </pc:sldChg>
+      <pc:sldChg chg="modSp add mod">
+        <pc:chgData name="Benjamin Michaelis" userId="047d050af9d747a3" providerId="LiveId" clId="{E9C26C98-DF0A-41A1-9F8C-982CDF906D42}" dt="2021-03-27T05:57:42.751" v="1491" actId="20577"/>
+        <pc:sldMkLst>
+          <pc:docMk/>
+          <pc:sldMk cId="3020810310" sldId="264"/>
+        </pc:sldMkLst>
+        <pc:spChg chg="mod">
+          <ac:chgData name="Benjamin Michaelis" userId="047d050af9d747a3" providerId="LiveId" clId="{E9C26C98-DF0A-41A1-9F8C-982CDF906D42}" dt="2021-03-27T05:56:37.614" v="1471" actId="20577"/>
+          <ac:spMkLst>
+            <pc:docMk/>
+            <pc:sldMk cId="3020810310" sldId="264"/>
+            <ac:spMk id="2" creationId="{7833FD6B-B85A-40C6-987E-2A7C562E0DFB}"/>
+          </ac:spMkLst>
+        </pc:spChg>
+        <pc:spChg chg="mod">
+          <ac:chgData name="Benjamin Michaelis" userId="047d050af9d747a3" providerId="LiveId" clId="{E9C26C98-DF0A-41A1-9F8C-982CDF906D42}" dt="2021-03-27T05:57:42.751" v="1491" actId="20577"/>
+          <ac:spMkLst>
+            <pc:docMk/>
+            <pc:sldMk cId="3020810310" sldId="264"/>
+            <ac:spMk id="3" creationId="{8D63D492-7BE7-4E60-B0C3-BD370D7C66BD}"/>
+          </ac:spMkLst>
+        </pc:spChg>
+      </pc:sldChg>
+      <pc:sldChg chg="modSp new mod">
+        <pc:chgData name="Benjamin Michaelis" userId="047d050af9d747a3" providerId="LiveId" clId="{E9C26C98-DF0A-41A1-9F8C-982CDF906D42}" dt="2021-03-27T06:04:10.747" v="1582" actId="20577"/>
+        <pc:sldMkLst>
+          <pc:docMk/>
+          <pc:sldMk cId="2901066272" sldId="265"/>
+        </pc:sldMkLst>
+        <pc:spChg chg="mod">
+          <ac:chgData name="Benjamin Michaelis" userId="047d050af9d747a3" providerId="LiveId" clId="{E9C26C98-DF0A-41A1-9F8C-982CDF906D42}" dt="2021-03-27T06:01:36.500" v="1534" actId="20577"/>
+          <ac:spMkLst>
+            <pc:docMk/>
+            <pc:sldMk cId="2901066272" sldId="265"/>
+            <ac:spMk id="2" creationId="{C09132CF-994E-437A-ABB7-14B3F72673EF}"/>
+          </ac:spMkLst>
+        </pc:spChg>
+        <pc:spChg chg="mod">
+          <ac:chgData name="Benjamin Michaelis" userId="047d050af9d747a3" providerId="LiveId" clId="{E9C26C98-DF0A-41A1-9F8C-982CDF906D42}" dt="2021-03-27T06:04:10.747" v="1582" actId="20577"/>
+          <ac:spMkLst>
+            <pc:docMk/>
+            <pc:sldMk cId="2901066272" sldId="265"/>
+            <ac:spMk id="3" creationId="{37A151B1-D43B-4DEB-95F4-5213D7FD14E7}"/>
+          </ac:spMkLst>
+        </pc:spChg>
+      </pc:sldChg>
+      <pc:sldChg chg="modSp add mod">
+        <pc:chgData name="Benjamin Michaelis" userId="047d050af9d747a3" providerId="LiveId" clId="{E9C26C98-DF0A-41A1-9F8C-982CDF906D42}" dt="2021-03-27T06:03:56.766" v="1577" actId="20577"/>
+        <pc:sldMkLst>
+          <pc:docMk/>
+          <pc:sldMk cId="2191981442" sldId="266"/>
+        </pc:sldMkLst>
+        <pc:spChg chg="mod">
+          <ac:chgData name="Benjamin Michaelis" userId="047d050af9d747a3" providerId="LiveId" clId="{E9C26C98-DF0A-41A1-9F8C-982CDF906D42}" dt="2021-03-27T06:03:56.766" v="1577" actId="20577"/>
+          <ac:spMkLst>
+            <pc:docMk/>
+            <pc:sldMk cId="2191981442" sldId="266"/>
+            <ac:spMk id="3" creationId="{37A151B1-D43B-4DEB-95F4-5213D7FD14E7}"/>
+          </ac:spMkLst>
+        </pc:spChg>
+      </pc:sldChg>
+      <pc:sldChg chg="modSp add mod">
+        <pc:chgData name="Benjamin Michaelis" userId="047d050af9d747a3" providerId="LiveId" clId="{E9C26C98-DF0A-41A1-9F8C-982CDF906D42}" dt="2021-03-27T06:04:02.519" v="1579"/>
+        <pc:sldMkLst>
+          <pc:docMk/>
+          <pc:sldMk cId="1197133609" sldId="267"/>
+        </pc:sldMkLst>
+        <pc:spChg chg="mod">
+          <ac:chgData name="Benjamin Michaelis" userId="047d050af9d747a3" providerId="LiveId" clId="{E9C26C98-DF0A-41A1-9F8C-982CDF906D42}" dt="2021-03-27T06:04:02.519" v="1579"/>
+          <ac:spMkLst>
+            <pc:docMk/>
+            <pc:sldMk cId="1197133609" sldId="267"/>
+            <ac:spMk id="3" creationId="{37A151B1-D43B-4DEB-95F4-5213D7FD14E7}"/>
+          </ac:spMkLst>
+        </pc:spChg>
+      </pc:sldChg>
+    </pc:docChg>
+  </pc:docChgLst>
   <pc:docChgLst>
     <pc:chgData name="Benjamin Michaelis" userId="047d050af9d747a3" providerId="LiveId" clId="{EEB03AC6-BDC3-4E48-908E-F8DAC1615E5F}"/>
     <pc:docChg chg="custSel addSld modSld addMainMaster delMainMaster">
@@ -851,7 +1143,7 @@
           <a:p>
             <a:fld id="{EA0C0817-A112-4847-8014-A94B7D2A4EA3}" type="datetime1">
               <a:rPr lang="en-US" smtClean="0"/>
-              <a:t>3/21/2021</a:t>
+              <a:t>3/26/2021</a:t>
             </a:fld>
             <a:endParaRPr lang="en-US" dirty="0"/>
           </a:p>
@@ -1053,7 +1345,7 @@
           <a:p>
             <a:fld id="{134F40B7-36AB-4376-BE14-EF7004D79BB9}" type="datetime1">
               <a:rPr lang="en-US" smtClean="0"/>
-              <a:t>3/21/2021</a:t>
+              <a:t>3/26/2021</a:t>
             </a:fld>
             <a:endParaRPr lang="en-US"/>
           </a:p>
@@ -1233,7 +1525,7 @@
           <a:p>
             <a:fld id="{FF87CAB8-DCAE-46A5-AADA-B3FAD11A54E0}" type="datetime1">
               <a:rPr lang="en-US" smtClean="0"/>
-              <a:t>3/21/2021</a:t>
+              <a:t>3/26/2021</a:t>
             </a:fld>
             <a:endParaRPr lang="en-US"/>
           </a:p>
@@ -1403,7 +1695,7 @@
           <a:p>
             <a:fld id="{7332B432-ACDA-4023-A761-2BAB76577B62}" type="datetime1">
               <a:rPr lang="en-US" smtClean="0"/>
-              <a:t>3/21/2021</a:t>
+              <a:t>3/26/2021</a:t>
             </a:fld>
             <a:endParaRPr lang="en-US"/>
           </a:p>
@@ -2002,7 +2294,7 @@
           <a:p>
             <a:fld id="{D9C646AA-F36E-4540-911D-FFFC0A0EF24A}" type="datetime1">
               <a:rPr lang="en-US" smtClean="0"/>
-              <a:t>3/21/2021</a:t>
+              <a:t>3/26/2021</a:t>
             </a:fld>
             <a:endParaRPr lang="en-US" dirty="0"/>
           </a:p>
@@ -2322,7 +2614,7 @@
           <a:p>
             <a:fld id="{69186D26-FA5F-4637-B602-B7C2DC34CFD4}" type="datetime1">
               <a:rPr lang="en-US" smtClean="0"/>
-              <a:t>3/21/2021</a:t>
+              <a:t>3/26/2021</a:t>
             </a:fld>
             <a:endParaRPr lang="en-US"/>
           </a:p>
@@ -2757,7 +3049,7 @@
           <a:p>
             <a:fld id="{8A7F15D8-96D1-4781-BC50-CA8A088B2FE4}" type="datetime1">
               <a:rPr lang="en-US" smtClean="0"/>
-              <a:t>3/21/2021</a:t>
+              <a:t>3/26/2021</a:t>
             </a:fld>
             <a:endParaRPr lang="en-US"/>
           </a:p>
@@ -2875,7 +3167,7 @@
           <a:p>
             <a:fld id="{F9A96C99-B8F8-4528-BD05-0E16E943DC09}" type="datetime1">
               <a:rPr lang="en-US" smtClean="0"/>
-              <a:t>3/21/2021</a:t>
+              <a:t>3/26/2021</a:t>
             </a:fld>
             <a:endParaRPr lang="en-US"/>
           </a:p>
@@ -2970,7 +3262,7 @@
           <a:p>
             <a:fld id="{03636942-C211-4B28-8DBD-C953E00AF71B}" type="datetime1">
               <a:rPr lang="en-US" smtClean="0"/>
-              <a:t>3/21/2021</a:t>
+              <a:t>3/26/2021</a:t>
             </a:fld>
             <a:endParaRPr lang="en-US"/>
           </a:p>
@@ -3387,7 +3679,7 @@
           <a:p>
             <a:fld id="{7E8D12A6-918A-48BD-8CB9-CA713993B0EA}" type="datetime1">
               <a:rPr lang="en-US" smtClean="0"/>
-              <a:t>3/21/2021</a:t>
+              <a:t>3/26/2021</a:t>
             </a:fld>
             <a:endParaRPr lang="en-US"/>
           </a:p>
@@ -3649,7 +3941,7 @@
             <a:fld id="{E778CE86-875F-4587-BCF6-FA054AFC0D53}" type="datetime1">
               <a:rPr lang="en-US" smtClean="0"/>
               <a:pPr/>
-              <a:t>3/21/2021</a:t>
+              <a:t>3/26/2021</a:t>
             </a:fld>
             <a:endParaRPr lang="en-US" dirty="0"/>
           </a:p>
@@ -4165,7 +4457,7 @@
           <a:p>
             <a:fld id="{F6FA2B21-3FCD-4721-B95C-427943F61125}" type="datetime1">
               <a:rPr lang="en-US" smtClean="0"/>
-              <a:t>3/21/2021</a:t>
+              <a:t>3/26/2021</a:t>
             </a:fld>
             <a:endParaRPr lang="en-US"/>
           </a:p>
@@ -4874,6 +5166,717 @@
 </p:sld>
 </file>
 
+<file path=ppt/slides/slide10.xml><?xml version="1.0" encoding="utf-8"?>
+<p:sld xmlns:a="http://schemas.openxmlformats.org/drawingml/2006/main" xmlns:r="http://schemas.openxmlformats.org/officeDocument/2006/relationships" xmlns:p="http://schemas.openxmlformats.org/presentationml/2006/main">
+  <p:cSld>
+    <p:spTree>
+      <p:nvGrpSpPr>
+        <p:cNvPr id="1" name=""/>
+        <p:cNvGrpSpPr/>
+        <p:nvPr/>
+      </p:nvGrpSpPr>
+      <p:grpSpPr>
+        <a:xfrm>
+          <a:off x="0" y="0"/>
+          <a:ext cx="0" cy="0"/>
+          <a:chOff x="0" y="0"/>
+          <a:chExt cx="0" cy="0"/>
+        </a:xfrm>
+      </p:grpSpPr>
+      <p:sp>
+        <p:nvSpPr>
+          <p:cNvPr id="2" name="Title 1">
+            <a:extLst>
+              <a:ext uri="{FF2B5EF4-FFF2-40B4-BE49-F238E27FC236}">
+                <a16:creationId xmlns:a16="http://schemas.microsoft.com/office/drawing/2014/main" id="{C09132CF-994E-437A-ABB7-14B3F72673EF}"/>
+              </a:ext>
+            </a:extLst>
+          </p:cNvPr>
+          <p:cNvSpPr>
+            <a:spLocks noGrp="1"/>
+          </p:cNvSpPr>
+          <p:nvPr>
+            <p:ph type="title"/>
+          </p:nvPr>
+        </p:nvSpPr>
+        <p:spPr/>
+        <p:txBody>
+          <a:bodyPr/>
+          <a:lstStyle/>
+          <a:p>
+            <a:r>
+              <a:rPr lang="en-US" dirty="0"/>
+              <a:t>Intro to pattern matching examples</a:t>
+            </a:r>
+          </a:p>
+        </p:txBody>
+      </p:sp>
+      <p:sp>
+        <p:nvSpPr>
+          <p:cNvPr id="3" name="Content Placeholder 2">
+            <a:extLst>
+              <a:ext uri="{FF2B5EF4-FFF2-40B4-BE49-F238E27FC236}">
+                <a16:creationId xmlns:a16="http://schemas.microsoft.com/office/drawing/2014/main" id="{37A151B1-D43B-4DEB-95F4-5213D7FD14E7}"/>
+              </a:ext>
+            </a:extLst>
+          </p:cNvPr>
+          <p:cNvSpPr>
+            <a:spLocks noGrp="1"/>
+          </p:cNvSpPr>
+          <p:nvPr>
+            <p:ph idx="1"/>
+          </p:nvPr>
+        </p:nvSpPr>
+        <p:spPr/>
+        <p:txBody>
+          <a:bodyPr>
+            <a:normAutofit/>
+          </a:bodyPr>
+          <a:lstStyle/>
+          <a:p>
+            <a:r>
+              <a:rPr lang="en-US" b="0" dirty="0">
+                <a:solidFill>
+                  <a:srgbClr val="569CD6"/>
+                </a:solidFill>
+                <a:effectLst/>
+                <a:latin typeface="Consolas" panose="020B0609020204030204" pitchFamily="49" charset="0"/>
+              </a:rPr>
+              <a:t>private</a:t>
+            </a:r>
+            <a:r>
+              <a:rPr lang="en-US" b="0" dirty="0">
+                <a:solidFill>
+                  <a:srgbClr val="CCCCCC"/>
+                </a:solidFill>
+                <a:effectLst/>
+                <a:latin typeface="Consolas" panose="020B0609020204030204" pitchFamily="49" charset="0"/>
+              </a:rPr>
+              <a:t> </a:t>
+            </a:r>
+            <a:r>
+              <a:rPr lang="en-US" b="0" dirty="0">
+                <a:solidFill>
+                  <a:srgbClr val="569CD6"/>
+                </a:solidFill>
+                <a:effectLst/>
+                <a:latin typeface="Consolas" panose="020B0609020204030204" pitchFamily="49" charset="0"/>
+              </a:rPr>
+              <a:t>static</a:t>
+            </a:r>
+            <a:r>
+              <a:rPr lang="en-US" b="0" dirty="0">
+                <a:solidFill>
+                  <a:srgbClr val="CCCCCC"/>
+                </a:solidFill>
+                <a:effectLst/>
+                <a:latin typeface="Consolas" panose="020B0609020204030204" pitchFamily="49" charset="0"/>
+              </a:rPr>
+              <a:t> </a:t>
+            </a:r>
+            <a:r>
+              <a:rPr lang="en-US" b="0" dirty="0" err="1">
+                <a:effectLst/>
+                <a:latin typeface="Consolas" panose="020B0609020204030204" pitchFamily="49" charset="0"/>
+              </a:rPr>
+              <a:t>IEnumerable</a:t>
+            </a:r>
+            <a:r>
+              <a:rPr lang="en-US" b="0" dirty="0">
+                <a:effectLst/>
+                <a:latin typeface="Consolas" panose="020B0609020204030204" pitchFamily="49" charset="0"/>
+              </a:rPr>
+              <a:t>&lt;Type&gt; </a:t>
+            </a:r>
+            <a:r>
+              <a:rPr lang="en-US" b="0" dirty="0" err="1">
+                <a:effectLst/>
+                <a:latin typeface="Consolas" panose="020B0609020204030204" pitchFamily="49" charset="0"/>
+              </a:rPr>
+              <a:t>GetShapes</a:t>
+            </a:r>
+            <a:r>
+              <a:rPr lang="en-US" b="0" dirty="0">
+                <a:effectLst/>
+                <a:latin typeface="Consolas" panose="020B0609020204030204" pitchFamily="49" charset="0"/>
+              </a:rPr>
+              <a:t>() =&gt; </a:t>
+            </a:r>
+            <a:r>
+              <a:rPr lang="en-US" b="0" dirty="0" err="1">
+                <a:effectLst/>
+                <a:latin typeface="Consolas" panose="020B0609020204030204" pitchFamily="49" charset="0"/>
+              </a:rPr>
+              <a:t>AppDomain.CurrentDomain.GetAssemblies</a:t>
+            </a:r>
+            <a:r>
+              <a:rPr lang="en-US" b="0" dirty="0">
+                <a:effectLst/>
+                <a:latin typeface="Consolas" panose="020B0609020204030204" pitchFamily="49" charset="0"/>
+              </a:rPr>
+              <a:t>().</a:t>
+            </a:r>
+            <a:r>
+              <a:rPr lang="en-US" b="0" dirty="0" err="1">
+                <a:effectLst/>
+                <a:latin typeface="Consolas" panose="020B0609020204030204" pitchFamily="49" charset="0"/>
+              </a:rPr>
+              <a:t>SelectMany</a:t>
+            </a:r>
+            <a:r>
+              <a:rPr lang="en-US" b="0" dirty="0">
+                <a:effectLst/>
+                <a:latin typeface="Consolas" panose="020B0609020204030204" pitchFamily="49" charset="0"/>
+              </a:rPr>
+              <a:t>(item =&gt; </a:t>
+            </a:r>
+            <a:r>
+              <a:rPr lang="en-US" b="0" dirty="0" err="1">
+                <a:effectLst/>
+                <a:latin typeface="Consolas" panose="020B0609020204030204" pitchFamily="49" charset="0"/>
+              </a:rPr>
+              <a:t>item.GetTypes</a:t>
+            </a:r>
+            <a:r>
+              <a:rPr lang="en-US" b="0" dirty="0">
+                <a:effectLst/>
+                <a:latin typeface="Consolas" panose="020B0609020204030204" pitchFamily="49" charset="0"/>
+              </a:rPr>
+              <a:t>().Where(type =&gt; </a:t>
+            </a:r>
+            <a:r>
+              <a:rPr lang="en-US" b="0" dirty="0" err="1">
+                <a:effectLst/>
+                <a:latin typeface="Consolas" panose="020B0609020204030204" pitchFamily="49" charset="0"/>
+              </a:rPr>
+              <a:t>type.IsSubclassOf</a:t>
+            </a:r>
+            <a:r>
+              <a:rPr lang="en-US" b="0" dirty="0">
+                <a:effectLst/>
+                <a:latin typeface="Consolas" panose="020B0609020204030204" pitchFamily="49" charset="0"/>
+              </a:rPr>
+              <a:t>(</a:t>
+            </a:r>
+            <a:r>
+              <a:rPr lang="en-US" b="0" dirty="0" err="1">
+                <a:solidFill>
+                  <a:srgbClr val="569CD6"/>
+                </a:solidFill>
+                <a:effectLst/>
+                <a:latin typeface="Consolas" panose="020B0609020204030204" pitchFamily="49" charset="0"/>
+              </a:rPr>
+              <a:t>typeof</a:t>
+            </a:r>
+            <a:r>
+              <a:rPr lang="en-US" b="0" dirty="0">
+                <a:effectLst/>
+                <a:latin typeface="Consolas" panose="020B0609020204030204" pitchFamily="49" charset="0"/>
+              </a:rPr>
+              <a:t>(Shape))));</a:t>
+            </a:r>
+          </a:p>
+        </p:txBody>
+      </p:sp>
+    </p:spTree>
+    <p:extLst>
+      <p:ext uri="{BB962C8B-B14F-4D97-AF65-F5344CB8AC3E}">
+        <p14:creationId xmlns:p14="http://schemas.microsoft.com/office/powerpoint/2010/main" val="2901066272"/>
+      </p:ext>
+    </p:extLst>
+  </p:cSld>
+  <p:clrMapOvr>
+    <a:masterClrMapping/>
+  </p:clrMapOvr>
+</p:sld>
+</file>
+
+<file path=ppt/slides/slide11.xml><?xml version="1.0" encoding="utf-8"?>
+<p:sld xmlns:a="http://schemas.openxmlformats.org/drawingml/2006/main" xmlns:r="http://schemas.openxmlformats.org/officeDocument/2006/relationships" xmlns:p="http://schemas.openxmlformats.org/presentationml/2006/main">
+  <p:cSld>
+    <p:spTree>
+      <p:nvGrpSpPr>
+        <p:cNvPr id="1" name=""/>
+        <p:cNvGrpSpPr/>
+        <p:nvPr/>
+      </p:nvGrpSpPr>
+      <p:grpSpPr>
+        <a:xfrm>
+          <a:off x="0" y="0"/>
+          <a:ext cx="0" cy="0"/>
+          <a:chOff x="0" y="0"/>
+          <a:chExt cx="0" cy="0"/>
+        </a:xfrm>
+      </p:grpSpPr>
+      <p:sp>
+        <p:nvSpPr>
+          <p:cNvPr id="2" name="Title 1">
+            <a:extLst>
+              <a:ext uri="{FF2B5EF4-FFF2-40B4-BE49-F238E27FC236}">
+                <a16:creationId xmlns:a16="http://schemas.microsoft.com/office/drawing/2014/main" id="{C09132CF-994E-437A-ABB7-14B3F72673EF}"/>
+              </a:ext>
+            </a:extLst>
+          </p:cNvPr>
+          <p:cNvSpPr>
+            <a:spLocks noGrp="1"/>
+          </p:cNvSpPr>
+          <p:nvPr>
+            <p:ph type="title"/>
+          </p:nvPr>
+        </p:nvSpPr>
+        <p:spPr/>
+        <p:txBody>
+          <a:bodyPr/>
+          <a:lstStyle/>
+          <a:p>
+            <a:r>
+              <a:rPr lang="en-US" dirty="0"/>
+              <a:t>Intro to pattern matching examples</a:t>
+            </a:r>
+          </a:p>
+        </p:txBody>
+      </p:sp>
+      <p:sp>
+        <p:nvSpPr>
+          <p:cNvPr id="3" name="Content Placeholder 2">
+            <a:extLst>
+              <a:ext uri="{FF2B5EF4-FFF2-40B4-BE49-F238E27FC236}">
+                <a16:creationId xmlns:a16="http://schemas.microsoft.com/office/drawing/2014/main" id="{37A151B1-D43B-4DEB-95F4-5213D7FD14E7}"/>
+              </a:ext>
+            </a:extLst>
+          </p:cNvPr>
+          <p:cNvSpPr>
+            <a:spLocks noGrp="1"/>
+          </p:cNvSpPr>
+          <p:nvPr>
+            <p:ph idx="1"/>
+          </p:nvPr>
+        </p:nvSpPr>
+        <p:spPr/>
+        <p:txBody>
+          <a:bodyPr>
+            <a:normAutofit/>
+          </a:bodyPr>
+          <a:lstStyle/>
+          <a:p>
+            <a:r>
+              <a:rPr lang="en-US" b="0" dirty="0">
+                <a:solidFill>
+                  <a:srgbClr val="569CD6"/>
+                </a:solidFill>
+                <a:effectLst/>
+                <a:latin typeface="Consolas" panose="020B0609020204030204" pitchFamily="49" charset="0"/>
+              </a:rPr>
+              <a:t>public</a:t>
+            </a:r>
+            <a:r>
+              <a:rPr lang="en-US" b="0" dirty="0">
+                <a:solidFill>
+                  <a:srgbClr val="CCCCCC"/>
+                </a:solidFill>
+                <a:effectLst/>
+                <a:latin typeface="Consolas" panose="020B0609020204030204" pitchFamily="49" charset="0"/>
+              </a:rPr>
+              <a:t> </a:t>
+            </a:r>
+            <a:r>
+              <a:rPr lang="en-US" b="0" dirty="0">
+                <a:effectLst/>
+                <a:latin typeface="Consolas" panose="020B0609020204030204" pitchFamily="49" charset="0"/>
+              </a:rPr>
+              <a:t>Dictionary&lt;</a:t>
+            </a:r>
+            <a:r>
+              <a:rPr lang="en-US" b="0" dirty="0">
+                <a:solidFill>
+                  <a:srgbClr val="569CD6"/>
+                </a:solidFill>
+                <a:effectLst/>
+                <a:latin typeface="Consolas" panose="020B0609020204030204" pitchFamily="49" charset="0"/>
+              </a:rPr>
+              <a:t>char</a:t>
+            </a:r>
+            <a:r>
+              <a:rPr lang="en-US" b="0" dirty="0">
+                <a:effectLst/>
+                <a:latin typeface="Consolas" panose="020B0609020204030204" pitchFamily="49" charset="0"/>
+              </a:rPr>
+              <a:t>, Type&gt; </a:t>
+            </a:r>
+            <a:r>
+              <a:rPr lang="en-US" b="0" dirty="0" err="1">
+                <a:effectLst/>
+                <a:latin typeface="Consolas" panose="020B0609020204030204" pitchFamily="49" charset="0"/>
+              </a:rPr>
+              <a:t>ShapeTypes</a:t>
+            </a:r>
+            <a:r>
+              <a:rPr lang="en-US" b="0" dirty="0">
+                <a:effectLst/>
+                <a:latin typeface="Consolas" panose="020B0609020204030204" pitchFamily="49" charset="0"/>
+              </a:rPr>
+              <a:t> { </a:t>
+            </a:r>
+            <a:r>
+              <a:rPr lang="en-US" b="0" dirty="0">
+                <a:solidFill>
+                  <a:srgbClr val="569CD6"/>
+                </a:solidFill>
+                <a:effectLst/>
+                <a:latin typeface="Consolas" panose="020B0609020204030204" pitchFamily="49" charset="0"/>
+              </a:rPr>
+              <a:t>get</a:t>
+            </a:r>
+            <a:r>
+              <a:rPr lang="en-US" b="0" dirty="0">
+                <a:effectLst/>
+                <a:latin typeface="Consolas" panose="020B0609020204030204" pitchFamily="49" charset="0"/>
+              </a:rPr>
+              <a:t>; } = </a:t>
+            </a:r>
+            <a:r>
+              <a:rPr lang="en-US" b="0" dirty="0" err="1">
+                <a:effectLst/>
+                <a:latin typeface="Consolas" panose="020B0609020204030204" pitchFamily="49" charset="0"/>
+              </a:rPr>
+              <a:t>GetShapes</a:t>
+            </a:r>
+            <a:r>
+              <a:rPr lang="en-US" b="0" dirty="0">
+                <a:effectLst/>
+                <a:latin typeface="Consolas" panose="020B0609020204030204" pitchFamily="49" charset="0"/>
+              </a:rPr>
+              <a:t>().</a:t>
+            </a:r>
+            <a:r>
+              <a:rPr lang="en-US" b="0" dirty="0" err="1">
+                <a:effectLst/>
+                <a:latin typeface="Consolas" panose="020B0609020204030204" pitchFamily="49" charset="0"/>
+              </a:rPr>
+              <a:t>ToDictionary</a:t>
+            </a:r>
+            <a:r>
+              <a:rPr lang="en-US" b="0" dirty="0">
+                <a:effectLst/>
+                <a:latin typeface="Consolas" panose="020B0609020204030204" pitchFamily="49" charset="0"/>
+              </a:rPr>
+              <a:t>(item =&gt; </a:t>
+            </a:r>
+            <a:r>
+              <a:rPr lang="en-US" b="0" dirty="0" err="1">
+                <a:solidFill>
+                  <a:srgbClr val="569CD6"/>
+                </a:solidFill>
+                <a:effectLst/>
+                <a:latin typeface="Consolas" panose="020B0609020204030204" pitchFamily="49" charset="0"/>
+              </a:rPr>
+              <a:t>char</a:t>
+            </a:r>
+            <a:r>
+              <a:rPr lang="en-US" b="0" dirty="0" err="1">
+                <a:effectLst/>
+                <a:latin typeface="Consolas" panose="020B0609020204030204" pitchFamily="49" charset="0"/>
+              </a:rPr>
+              <a:t>.ToLower</a:t>
+            </a:r>
+            <a:r>
+              <a:rPr lang="en-US" b="0" dirty="0">
+                <a:effectLst/>
+                <a:latin typeface="Consolas" panose="020B0609020204030204" pitchFamily="49" charset="0"/>
+              </a:rPr>
+              <a:t>(</a:t>
+            </a:r>
+            <a:r>
+              <a:rPr lang="en-US" b="0" dirty="0" err="1">
+                <a:effectLst/>
+                <a:latin typeface="Consolas" panose="020B0609020204030204" pitchFamily="49" charset="0"/>
+              </a:rPr>
+              <a:t>item.Name</a:t>
+            </a:r>
+            <a:r>
+              <a:rPr lang="en-US" b="0" dirty="0">
+                <a:effectLst/>
+                <a:latin typeface="Consolas" panose="020B0609020204030204" pitchFamily="49" charset="0"/>
+              </a:rPr>
+              <a:t>[0]));</a:t>
+            </a:r>
+          </a:p>
+          <a:p>
+            <a:endParaRPr lang="en-US" dirty="0"/>
+          </a:p>
+        </p:txBody>
+      </p:sp>
+    </p:spTree>
+    <p:extLst>
+      <p:ext uri="{BB962C8B-B14F-4D97-AF65-F5344CB8AC3E}">
+        <p14:creationId xmlns:p14="http://schemas.microsoft.com/office/powerpoint/2010/main" val="2191981442"/>
+      </p:ext>
+    </p:extLst>
+  </p:cSld>
+  <p:clrMapOvr>
+    <a:masterClrMapping/>
+  </p:clrMapOvr>
+</p:sld>
+</file>
+
+<file path=ppt/slides/slide12.xml><?xml version="1.0" encoding="utf-8"?>
+<p:sld xmlns:a="http://schemas.openxmlformats.org/drawingml/2006/main" xmlns:r="http://schemas.openxmlformats.org/officeDocument/2006/relationships" xmlns:p="http://schemas.openxmlformats.org/presentationml/2006/main">
+  <p:cSld>
+    <p:spTree>
+      <p:nvGrpSpPr>
+        <p:cNvPr id="1" name=""/>
+        <p:cNvGrpSpPr/>
+        <p:nvPr/>
+      </p:nvGrpSpPr>
+      <p:grpSpPr>
+        <a:xfrm>
+          <a:off x="0" y="0"/>
+          <a:ext cx="0" cy="0"/>
+          <a:chOff x="0" y="0"/>
+          <a:chExt cx="0" cy="0"/>
+        </a:xfrm>
+      </p:grpSpPr>
+      <p:sp>
+        <p:nvSpPr>
+          <p:cNvPr id="2" name="Title 1">
+            <a:extLst>
+              <a:ext uri="{FF2B5EF4-FFF2-40B4-BE49-F238E27FC236}">
+                <a16:creationId xmlns:a16="http://schemas.microsoft.com/office/drawing/2014/main" id="{C09132CF-994E-437A-ABB7-14B3F72673EF}"/>
+              </a:ext>
+            </a:extLst>
+          </p:cNvPr>
+          <p:cNvSpPr>
+            <a:spLocks noGrp="1"/>
+          </p:cNvSpPr>
+          <p:nvPr>
+            <p:ph type="title"/>
+          </p:nvPr>
+        </p:nvSpPr>
+        <p:spPr/>
+        <p:txBody>
+          <a:bodyPr/>
+          <a:lstStyle/>
+          <a:p>
+            <a:r>
+              <a:rPr lang="en-US" dirty="0"/>
+              <a:t>Intro to pattern matching examples</a:t>
+            </a:r>
+          </a:p>
+        </p:txBody>
+      </p:sp>
+      <p:sp>
+        <p:nvSpPr>
+          <p:cNvPr id="3" name="Content Placeholder 2">
+            <a:extLst>
+              <a:ext uri="{FF2B5EF4-FFF2-40B4-BE49-F238E27FC236}">
+                <a16:creationId xmlns:a16="http://schemas.microsoft.com/office/drawing/2014/main" id="{37A151B1-D43B-4DEB-95F4-5213D7FD14E7}"/>
+              </a:ext>
+            </a:extLst>
+          </p:cNvPr>
+          <p:cNvSpPr>
+            <a:spLocks noGrp="1"/>
+          </p:cNvSpPr>
+          <p:nvPr>
+            <p:ph idx="1"/>
+          </p:nvPr>
+        </p:nvSpPr>
+        <p:spPr/>
+        <p:txBody>
+          <a:bodyPr>
+            <a:normAutofit/>
+          </a:bodyPr>
+          <a:lstStyle/>
+          <a:p>
+            <a:r>
+              <a:rPr lang="en-US" b="0" dirty="0">
+                <a:solidFill>
+                  <a:srgbClr val="569CD6"/>
+                </a:solidFill>
+                <a:effectLst/>
+                <a:latin typeface="Consolas" panose="020B0609020204030204" pitchFamily="49" charset="0"/>
+              </a:rPr>
+              <a:t>private</a:t>
+            </a:r>
+            <a:r>
+              <a:rPr lang="en-US" b="0" dirty="0">
+                <a:solidFill>
+                  <a:srgbClr val="CCCCCC"/>
+                </a:solidFill>
+                <a:effectLst/>
+                <a:latin typeface="Consolas" panose="020B0609020204030204" pitchFamily="49" charset="0"/>
+              </a:rPr>
+              <a:t> </a:t>
+            </a:r>
+            <a:r>
+              <a:rPr lang="en-US" b="0" dirty="0" err="1">
+                <a:effectLst/>
+                <a:latin typeface="Consolas" panose="020B0609020204030204" pitchFamily="49" charset="0"/>
+              </a:rPr>
+              <a:t>IEnumerable</a:t>
+            </a:r>
+            <a:r>
+              <a:rPr lang="en-US" b="0" dirty="0">
+                <a:effectLst/>
+                <a:latin typeface="Consolas" panose="020B0609020204030204" pitchFamily="49" charset="0"/>
+              </a:rPr>
+              <a:t>&lt;Shape&gt; Shapes</a:t>
+            </a:r>
+          </a:p>
+          <a:p>
+            <a:pPr marL="0" indent="0">
+              <a:buNone/>
+            </a:pPr>
+            <a:r>
+              <a:rPr lang="en-US" b="0" dirty="0">
+                <a:effectLst/>
+                <a:latin typeface="Consolas" panose="020B0609020204030204" pitchFamily="49" charset="0"/>
+              </a:rPr>
+              <a:t>{</a:t>
+            </a:r>
+          </a:p>
+          <a:p>
+            <a:pPr marL="274320" lvl="1" indent="0">
+              <a:buNone/>
+            </a:pPr>
+            <a:r>
+              <a:rPr lang="en-US" b="0" dirty="0">
+                <a:solidFill>
+                  <a:srgbClr val="569CD6"/>
+                </a:solidFill>
+                <a:effectLst/>
+                <a:latin typeface="Consolas" panose="020B0609020204030204" pitchFamily="49" charset="0"/>
+              </a:rPr>
+              <a:t>get</a:t>
+            </a:r>
+            <a:endParaRPr lang="en-US" b="0" dirty="0">
+              <a:solidFill>
+                <a:srgbClr val="CCCCCC"/>
+              </a:solidFill>
+              <a:effectLst/>
+              <a:latin typeface="Consolas" panose="020B0609020204030204" pitchFamily="49" charset="0"/>
+            </a:endParaRPr>
+          </a:p>
+          <a:p>
+            <a:pPr marL="274320" lvl="1" indent="0">
+              <a:buNone/>
+            </a:pPr>
+            <a:r>
+              <a:rPr lang="en-US" b="0" dirty="0">
+                <a:effectLst/>
+                <a:latin typeface="Consolas" panose="020B0609020204030204" pitchFamily="49" charset="0"/>
+              </a:rPr>
+              <a:t>{</a:t>
+            </a:r>
+          </a:p>
+          <a:p>
+            <a:pPr marL="274320" lvl="1" indent="0">
+              <a:buNone/>
+            </a:pPr>
+            <a:r>
+              <a:rPr lang="en-US" b="0" dirty="0">
+                <a:solidFill>
+                  <a:srgbClr val="569CD6"/>
+                </a:solidFill>
+                <a:effectLst/>
+                <a:latin typeface="Consolas" panose="020B0609020204030204" pitchFamily="49" charset="0"/>
+              </a:rPr>
+              <a:t>return</a:t>
+            </a:r>
+            <a:r>
+              <a:rPr lang="en-US" b="0" dirty="0">
+                <a:solidFill>
+                  <a:srgbClr val="CCCCCC"/>
+                </a:solidFill>
+                <a:effectLst/>
+                <a:latin typeface="Consolas" panose="020B0609020204030204" pitchFamily="49" charset="0"/>
+              </a:rPr>
+              <a:t> </a:t>
+            </a:r>
+            <a:r>
+              <a:rPr lang="en-US" b="0" dirty="0">
+                <a:solidFill>
+                  <a:srgbClr val="569CD6"/>
+                </a:solidFill>
+                <a:effectLst/>
+                <a:latin typeface="Consolas" panose="020B0609020204030204" pitchFamily="49" charset="0"/>
+              </a:rPr>
+              <a:t>this</a:t>
+            </a:r>
+            <a:r>
+              <a:rPr lang="en-US" b="0" dirty="0">
+                <a:effectLst/>
+                <a:latin typeface="Consolas" panose="020B0609020204030204" pitchFamily="49" charset="0"/>
+              </a:rPr>
+              <a:t>._</a:t>
+            </a:r>
+            <a:r>
+              <a:rPr lang="en-US" b="0" dirty="0" err="1">
+                <a:effectLst/>
+                <a:latin typeface="Consolas" panose="020B0609020204030204" pitchFamily="49" charset="0"/>
+              </a:rPr>
+              <a:t>sequences.SelectMany</a:t>
+            </a:r>
+            <a:r>
+              <a:rPr lang="en-US" b="0" dirty="0">
+                <a:effectLst/>
+                <a:latin typeface="Consolas" panose="020B0609020204030204" pitchFamily="49" charset="0"/>
+              </a:rPr>
+              <a:t>(item =&gt; item).</a:t>
+            </a:r>
+            <a:r>
+              <a:rPr lang="en-US" b="0" dirty="0" err="1">
+                <a:effectLst/>
+                <a:latin typeface="Consolas" panose="020B0609020204030204" pitchFamily="49" charset="0"/>
+              </a:rPr>
+              <a:t>ToList</a:t>
+            </a:r>
+            <a:r>
+              <a:rPr lang="en-US" b="0" dirty="0">
+                <a:effectLst/>
+                <a:latin typeface="Consolas" panose="020B0609020204030204" pitchFamily="49" charset="0"/>
+              </a:rPr>
+              <a:t>();</a:t>
+            </a:r>
+          </a:p>
+          <a:p>
+            <a:pPr marL="274320" lvl="1" indent="0">
+              <a:buNone/>
+            </a:pPr>
+            <a:r>
+              <a:rPr lang="en-US" b="0" dirty="0">
+                <a:effectLst/>
+                <a:latin typeface="Consolas" panose="020B0609020204030204" pitchFamily="49" charset="0"/>
+              </a:rPr>
+              <a:t>}</a:t>
+            </a:r>
+          </a:p>
+          <a:p>
+            <a:pPr marL="0" indent="0">
+              <a:buNone/>
+            </a:pPr>
+            <a:r>
+              <a:rPr lang="en-US" b="0" dirty="0">
+                <a:effectLst/>
+                <a:latin typeface="Consolas" panose="020B0609020204030204" pitchFamily="49" charset="0"/>
+              </a:rPr>
+              <a:t>}</a:t>
+            </a:r>
+          </a:p>
+        </p:txBody>
+      </p:sp>
+    </p:spTree>
+    <p:extLst>
+      <p:ext uri="{BB962C8B-B14F-4D97-AF65-F5344CB8AC3E}">
+        <p14:creationId xmlns:p14="http://schemas.microsoft.com/office/powerpoint/2010/main" val="1197133609"/>
+      </p:ext>
+    </p:extLst>
+  </p:cSld>
+  <p:clrMapOvr>
+    <a:masterClrMapping/>
+  </p:clrMapOvr>
+</p:sld>
+</file>
+
 <file path=ppt/slides/slide2.xml><?xml version="1.0" encoding="utf-8"?>
 <p:sld xmlns:a="http://schemas.openxmlformats.org/drawingml/2006/main" xmlns:r="http://schemas.openxmlformats.org/officeDocument/2006/relationships" xmlns:p="http://schemas.openxmlformats.org/presentationml/2006/main">
   <p:cSld>
@@ -4896,6 +5899,1166 @@
           <p:cNvPr id="2" name="Title 1">
             <a:extLst>
               <a:ext uri="{FF2B5EF4-FFF2-40B4-BE49-F238E27FC236}">
+                <a16:creationId xmlns:a16="http://schemas.microsoft.com/office/drawing/2014/main" id="{2A7125D5-E513-4965-ABD8-20A16F4EF4AD}"/>
+              </a:ext>
+            </a:extLst>
+          </p:cNvPr>
+          <p:cNvSpPr>
+            <a:spLocks noGrp="1"/>
+          </p:cNvSpPr>
+          <p:nvPr>
+            <p:ph type="title"/>
+          </p:nvPr>
+        </p:nvSpPr>
+        <p:spPr/>
+        <p:txBody>
+          <a:bodyPr/>
+          <a:lstStyle/>
+          <a:p>
+            <a:r>
+              <a:rPr lang="en-US" dirty="0"/>
+              <a:t>What is nullability and why does it matter</a:t>
+            </a:r>
+          </a:p>
+        </p:txBody>
+      </p:sp>
+      <p:sp>
+        <p:nvSpPr>
+          <p:cNvPr id="3" name="Content Placeholder 2">
+            <a:extLst>
+              <a:ext uri="{FF2B5EF4-FFF2-40B4-BE49-F238E27FC236}">
+                <a16:creationId xmlns:a16="http://schemas.microsoft.com/office/drawing/2014/main" id="{B85D6BFC-0B1C-4DF5-918C-631E141B4ABC}"/>
+              </a:ext>
+            </a:extLst>
+          </p:cNvPr>
+          <p:cNvSpPr>
+            <a:spLocks noGrp="1"/>
+          </p:cNvSpPr>
+          <p:nvPr>
+            <p:ph idx="1"/>
+          </p:nvPr>
+        </p:nvSpPr>
+        <p:spPr/>
+        <p:txBody>
+          <a:bodyPr>
+            <a:normAutofit/>
+          </a:bodyPr>
+          <a:lstStyle/>
+          <a:p>
+            <a:r>
+              <a:rPr lang="en-US" sz="2000" dirty="0"/>
+              <a:t>Often developers assume that reference types (accept non-null and null both and there wasn't any explicit handling required and unfortunately this consideration is one of the primary root causes of famous "Null Reference Exception".</a:t>
+            </a:r>
+          </a:p>
+          <a:p>
+            <a:r>
+              <a:rPr lang="en-US" sz="2000" dirty="0"/>
+              <a:t>This </a:t>
+            </a:r>
+            <a:r>
+              <a:rPr lang="en-US" sz="2000" dirty="0" err="1"/>
+              <a:t>NullReferenceException</a:t>
+            </a:r>
+            <a:r>
+              <a:rPr lang="en-US" sz="2000" dirty="0"/>
+              <a:t> is thrown by the program whenever a developer attempts to access any type which has value as null.</a:t>
+            </a:r>
+          </a:p>
+          <a:p>
+            <a:r>
+              <a:rPr lang="en-US" sz="2000" dirty="0"/>
+              <a:t>This means we try to access a value or reference that holds no value or a null value.</a:t>
+            </a:r>
+          </a:p>
+        </p:txBody>
+      </p:sp>
+    </p:spTree>
+    <p:extLst>
+      <p:ext uri="{BB962C8B-B14F-4D97-AF65-F5344CB8AC3E}">
+        <p14:creationId xmlns:p14="http://schemas.microsoft.com/office/powerpoint/2010/main" val="2953954537"/>
+      </p:ext>
+    </p:extLst>
+  </p:cSld>
+  <p:clrMapOvr>
+    <a:masterClrMapping/>
+  </p:clrMapOvr>
+</p:sld>
+</file>
+
+<file path=ppt/slides/slide3.xml><?xml version="1.0" encoding="utf-8"?>
+<p:sld xmlns:a="http://schemas.openxmlformats.org/drawingml/2006/main" xmlns:r="http://schemas.openxmlformats.org/officeDocument/2006/relationships" xmlns:p="http://schemas.openxmlformats.org/presentationml/2006/main">
+  <p:cSld>
+    <p:spTree>
+      <p:nvGrpSpPr>
+        <p:cNvPr id="1" name=""/>
+        <p:cNvGrpSpPr/>
+        <p:nvPr/>
+      </p:nvGrpSpPr>
+      <p:grpSpPr>
+        <a:xfrm>
+          <a:off x="0" y="0"/>
+          <a:ext cx="0" cy="0"/>
+          <a:chOff x="0" y="0"/>
+          <a:chExt cx="0" cy="0"/>
+        </a:xfrm>
+      </p:grpSpPr>
+      <p:sp>
+        <p:nvSpPr>
+          <p:cNvPr id="2" name="Title 1">
+            <a:extLst>
+              <a:ext uri="{FF2B5EF4-FFF2-40B4-BE49-F238E27FC236}">
+                <a16:creationId xmlns:a16="http://schemas.microsoft.com/office/drawing/2014/main" id="{A0BD10A4-536C-4567-A84B-A1BC866664C1}"/>
+              </a:ext>
+            </a:extLst>
+          </p:cNvPr>
+          <p:cNvSpPr>
+            <a:spLocks noGrp="1"/>
+          </p:cNvSpPr>
+          <p:nvPr>
+            <p:ph type="title"/>
+          </p:nvPr>
+        </p:nvSpPr>
+        <p:spPr/>
+        <p:txBody>
+          <a:bodyPr/>
+          <a:lstStyle/>
+          <a:p>
+            <a:r>
+              <a:rPr lang="en-US" dirty="0"/>
+              <a:t>What is a nullable value type?</a:t>
+            </a:r>
+          </a:p>
+        </p:txBody>
+      </p:sp>
+      <p:sp>
+        <p:nvSpPr>
+          <p:cNvPr id="3" name="Content Placeholder 2">
+            <a:extLst>
+              <a:ext uri="{FF2B5EF4-FFF2-40B4-BE49-F238E27FC236}">
+                <a16:creationId xmlns:a16="http://schemas.microsoft.com/office/drawing/2014/main" id="{A6310C60-4DBF-458F-8A5B-A162E7FB33A8}"/>
+              </a:ext>
+            </a:extLst>
+          </p:cNvPr>
+          <p:cNvSpPr>
+            <a:spLocks noGrp="1"/>
+          </p:cNvSpPr>
+          <p:nvPr>
+            <p:ph idx="1"/>
+          </p:nvPr>
+        </p:nvSpPr>
+        <p:spPr>
+          <a:xfrm>
+            <a:off x="1066800" y="1815152"/>
+            <a:ext cx="10058400" cy="4137592"/>
+          </a:xfrm>
+        </p:spPr>
+        <p:txBody>
+          <a:bodyPr>
+            <a:normAutofit/>
+          </a:bodyPr>
+          <a:lstStyle/>
+          <a:p>
+            <a:r>
+              <a:rPr lang="en-US" sz="2000" dirty="0"/>
+              <a:t>Have been available since C# 2.0</a:t>
+            </a:r>
+          </a:p>
+          <a:p>
+            <a:r>
+              <a:rPr lang="en-US" sz="2000" dirty="0"/>
+              <a:t>A nullable value type holds all of its possible values and also null.</a:t>
+            </a:r>
+          </a:p>
+          <a:p>
+            <a:pPr lvl="1"/>
+            <a:r>
+              <a:rPr lang="en-US" sz="1800" dirty="0"/>
+              <a:t>Ex: you can assign any of the following three values to a bool? variable: true, false, or null</a:t>
+            </a:r>
+          </a:p>
+          <a:p>
+            <a:r>
+              <a:rPr lang="en-US" sz="2000" dirty="0"/>
+              <a:t>When do you use this signature?</a:t>
+            </a:r>
+          </a:p>
+          <a:p>
+            <a:pPr lvl="1"/>
+            <a:r>
+              <a:rPr lang="en-US" sz="1800" dirty="0"/>
+              <a:t>When a variable value could be undefined or missing.</a:t>
+            </a:r>
+          </a:p>
+          <a:p>
+            <a:pPr lvl="1"/>
+            <a:r>
+              <a:rPr lang="en-US" sz="1800" dirty="0"/>
+              <a:t>For example, a database field in an application may contain true or false, or it may contain no value at all, that is, null. You can use the bool? type in that scenario</a:t>
+            </a:r>
+          </a:p>
+          <a:p>
+            <a:pPr marL="274320" lvl="1" indent="0">
+              <a:buNone/>
+            </a:pPr>
+            <a:endParaRPr lang="en-US" dirty="0">
+              <a:solidFill>
+                <a:srgbClr val="008000"/>
+              </a:solidFill>
+              <a:latin typeface="SFMono-Regular"/>
+            </a:endParaRPr>
+          </a:p>
+          <a:p>
+            <a:pPr marL="274320" lvl="1" indent="0">
+              <a:buNone/>
+            </a:pPr>
+            <a:r>
+              <a:rPr lang="en-US" dirty="0"/>
+              <a:t>MSDN Documentation:</a:t>
+            </a:r>
+            <a:r>
+              <a:rPr lang="en-US" dirty="0">
+                <a:solidFill>
+                  <a:srgbClr val="008000"/>
+                </a:solidFill>
+                <a:latin typeface="SFMono-Regular"/>
+              </a:rPr>
+              <a:t> </a:t>
+            </a:r>
+            <a:r>
+              <a:rPr lang="en-US" dirty="0">
+                <a:hlinkClick r:id="rId2"/>
+              </a:rPr>
+              <a:t>https://docs.microsoft.com/en-us/dotnet/csharp/language-reference/builtin-types/nullable-value-types</a:t>
+            </a:r>
+            <a:endParaRPr lang="en-US" dirty="0"/>
+          </a:p>
+        </p:txBody>
+      </p:sp>
+    </p:spTree>
+    <p:extLst>
+      <p:ext uri="{BB962C8B-B14F-4D97-AF65-F5344CB8AC3E}">
+        <p14:creationId xmlns:p14="http://schemas.microsoft.com/office/powerpoint/2010/main" val="2235926313"/>
+      </p:ext>
+    </p:extLst>
+  </p:cSld>
+  <p:clrMapOvr>
+    <a:masterClrMapping/>
+  </p:clrMapOvr>
+</p:sld>
+</file>
+
+<file path=ppt/slides/slide4.xml><?xml version="1.0" encoding="utf-8"?>
+<p:sld xmlns:a="http://schemas.openxmlformats.org/drawingml/2006/main" xmlns:r="http://schemas.openxmlformats.org/officeDocument/2006/relationships" xmlns:p="http://schemas.openxmlformats.org/presentationml/2006/main">
+  <p:cSld>
+    <p:spTree>
+      <p:nvGrpSpPr>
+        <p:cNvPr id="1" name=""/>
+        <p:cNvGrpSpPr/>
+        <p:nvPr/>
+      </p:nvGrpSpPr>
+      <p:grpSpPr>
+        <a:xfrm>
+          <a:off x="0" y="0"/>
+          <a:ext cx="0" cy="0"/>
+          <a:chOff x="0" y="0"/>
+          <a:chExt cx="0" cy="0"/>
+        </a:xfrm>
+      </p:grpSpPr>
+      <p:sp>
+        <p:nvSpPr>
+          <p:cNvPr id="2" name="Title 1">
+            <a:extLst>
+              <a:ext uri="{FF2B5EF4-FFF2-40B4-BE49-F238E27FC236}">
+                <a16:creationId xmlns:a16="http://schemas.microsoft.com/office/drawing/2014/main" id="{A0BD10A4-536C-4567-A84B-A1BC866664C1}"/>
+              </a:ext>
+            </a:extLst>
+          </p:cNvPr>
+          <p:cNvSpPr>
+            <a:spLocks noGrp="1"/>
+          </p:cNvSpPr>
+          <p:nvPr>
+            <p:ph type="title"/>
+          </p:nvPr>
+        </p:nvSpPr>
+        <p:spPr/>
+        <p:txBody>
+          <a:bodyPr/>
+          <a:lstStyle/>
+          <a:p>
+            <a:r>
+              <a:rPr lang="en-US" dirty="0"/>
+              <a:t>Nullable value type?</a:t>
+            </a:r>
+          </a:p>
+        </p:txBody>
+      </p:sp>
+      <p:sp>
+        <p:nvSpPr>
+          <p:cNvPr id="3" name="Content Placeholder 2">
+            <a:extLst>
+              <a:ext uri="{FF2B5EF4-FFF2-40B4-BE49-F238E27FC236}">
+                <a16:creationId xmlns:a16="http://schemas.microsoft.com/office/drawing/2014/main" id="{A6310C60-4DBF-458F-8A5B-A162E7FB33A8}"/>
+              </a:ext>
+            </a:extLst>
+          </p:cNvPr>
+          <p:cNvSpPr>
+            <a:spLocks noGrp="1"/>
+          </p:cNvSpPr>
+          <p:nvPr>
+            <p:ph idx="1"/>
+          </p:nvPr>
+        </p:nvSpPr>
+        <p:spPr>
+          <a:xfrm>
+            <a:off x="1066800" y="1815152"/>
+            <a:ext cx="10058400" cy="4137592"/>
+          </a:xfrm>
+        </p:spPr>
+        <p:txBody>
+          <a:bodyPr>
+            <a:normAutofit/>
+          </a:bodyPr>
+          <a:lstStyle/>
+          <a:p>
+            <a:pPr marL="274320" lvl="1" indent="0">
+              <a:buNone/>
+            </a:pPr>
+            <a:r>
+              <a:rPr lang="en-US" sz="2000" dirty="0">
+                <a:latin typeface="SFMono-Regular"/>
+              </a:rPr>
+              <a:t>Examples:</a:t>
+            </a:r>
+            <a:endParaRPr lang="en-US" dirty="0"/>
+          </a:p>
+          <a:p>
+            <a:pPr marL="274320" lvl="1" indent="0">
+              <a:buNone/>
+            </a:pPr>
+            <a:r>
+              <a:rPr lang="en-US" sz="2000" b="0" i="0" dirty="0">
+                <a:solidFill>
+                  <a:srgbClr val="0101FD"/>
+                </a:solidFill>
+                <a:effectLst/>
+                <a:latin typeface="SFMono-Regular"/>
+              </a:rPr>
+              <a:t>int</a:t>
+            </a:r>
+            <a:r>
+              <a:rPr lang="en-US" sz="2000" b="0" i="0" dirty="0">
+                <a:solidFill>
+                  <a:srgbClr val="171717"/>
+                </a:solidFill>
+                <a:effectLst/>
+                <a:latin typeface="SFMono-Regular"/>
+              </a:rPr>
+              <a:t>? n = </a:t>
+            </a:r>
+            <a:r>
+              <a:rPr lang="en-US" sz="2000" b="0" i="0" dirty="0">
+                <a:solidFill>
+                  <a:srgbClr val="07704A"/>
+                </a:solidFill>
+                <a:effectLst/>
+                <a:latin typeface="SFMono-Regular"/>
+              </a:rPr>
+              <a:t>null</a:t>
+            </a:r>
+            <a:r>
+              <a:rPr lang="en-US" sz="2000" b="0" i="0" dirty="0">
+                <a:solidFill>
+                  <a:srgbClr val="171717"/>
+                </a:solidFill>
+                <a:effectLst/>
+                <a:latin typeface="SFMono-Regular"/>
+              </a:rPr>
+              <a:t>; </a:t>
+            </a:r>
+          </a:p>
+          <a:p>
+            <a:pPr marL="274320" lvl="1" indent="0">
+              <a:buNone/>
+            </a:pPr>
+            <a:r>
+              <a:rPr lang="en-US" sz="2000" b="0" i="0" dirty="0">
+                <a:solidFill>
+                  <a:srgbClr val="008000"/>
+                </a:solidFill>
+                <a:effectLst/>
+                <a:latin typeface="SFMono-Regular"/>
+              </a:rPr>
+              <a:t>// int m1 = n; // Doesn't compile</a:t>
+            </a:r>
+            <a:r>
+              <a:rPr lang="en-US" sz="2000" b="0" i="0" dirty="0">
+                <a:solidFill>
+                  <a:srgbClr val="171717"/>
+                </a:solidFill>
+                <a:effectLst/>
+                <a:latin typeface="SFMono-Regular"/>
+              </a:rPr>
+              <a:t> </a:t>
+            </a:r>
+          </a:p>
+          <a:p>
+            <a:pPr marL="274320" lvl="1" indent="0">
+              <a:buNone/>
+            </a:pPr>
+            <a:r>
+              <a:rPr lang="en-US" sz="2000" b="0" i="0" dirty="0">
+                <a:solidFill>
+                  <a:srgbClr val="008000"/>
+                </a:solidFill>
+                <a:effectLst/>
+                <a:latin typeface="SFMono-Regular"/>
+              </a:rPr>
+              <a:t>// int m2 = null; // Doesn't compile</a:t>
+            </a:r>
+            <a:endParaRPr lang="en-US" sz="2000" b="0" i="0" dirty="0">
+              <a:solidFill>
+                <a:srgbClr val="171717"/>
+              </a:solidFill>
+              <a:effectLst/>
+              <a:latin typeface="SFMono-Regular"/>
+            </a:endParaRPr>
+          </a:p>
+          <a:p>
+            <a:pPr marL="274320" lvl="1" indent="0">
+              <a:buNone/>
+            </a:pPr>
+            <a:r>
+              <a:rPr lang="en-US" sz="2000" b="0" i="0" dirty="0">
+                <a:solidFill>
+                  <a:srgbClr val="0101FD"/>
+                </a:solidFill>
+                <a:effectLst/>
+                <a:latin typeface="SFMono-Regular"/>
+              </a:rPr>
+              <a:t>int</a:t>
+            </a:r>
+            <a:r>
+              <a:rPr lang="en-US" sz="2000" b="0" i="0" dirty="0">
+                <a:solidFill>
+                  <a:srgbClr val="171717"/>
+                </a:solidFill>
+                <a:effectLst/>
+                <a:latin typeface="SFMono-Regular"/>
+              </a:rPr>
+              <a:t> n2 = (</a:t>
+            </a:r>
+            <a:r>
+              <a:rPr lang="en-US" sz="2000" b="0" i="0" dirty="0">
+                <a:solidFill>
+                  <a:srgbClr val="0101FD"/>
+                </a:solidFill>
+                <a:effectLst/>
+                <a:latin typeface="SFMono-Regular"/>
+              </a:rPr>
+              <a:t>int</a:t>
+            </a:r>
+            <a:r>
+              <a:rPr lang="en-US" sz="2000" b="0" i="0" dirty="0">
+                <a:solidFill>
+                  <a:srgbClr val="171717"/>
+                </a:solidFill>
+                <a:effectLst/>
+                <a:latin typeface="SFMono-Regular"/>
+              </a:rPr>
+              <a:t>)n; </a:t>
+            </a:r>
+            <a:r>
+              <a:rPr lang="en-US" sz="2000" b="0" i="0" dirty="0">
+                <a:solidFill>
+                  <a:srgbClr val="008000"/>
+                </a:solidFill>
+                <a:effectLst/>
+                <a:latin typeface="SFMono-Regular"/>
+              </a:rPr>
+              <a:t>// Compiles, but throws an exception if n is null</a:t>
+            </a:r>
+          </a:p>
+          <a:p>
+            <a:pPr marL="274320" lvl="1" indent="0">
+              <a:buNone/>
+            </a:pPr>
+            <a:r>
+              <a:rPr lang="en-US" sz="2000" dirty="0">
+                <a:solidFill>
+                  <a:srgbClr val="008000"/>
+                </a:solidFill>
+                <a:latin typeface="SFMono-Regular"/>
+              </a:rPr>
+              <a:t>// n2 = null; // Doesn’t compile</a:t>
+            </a:r>
+            <a:endParaRPr lang="en-US" sz="2000" b="0" i="0" dirty="0">
+              <a:solidFill>
+                <a:srgbClr val="008000"/>
+              </a:solidFill>
+              <a:effectLst/>
+              <a:latin typeface="SFMono-Regular"/>
+            </a:endParaRPr>
+          </a:p>
+          <a:p>
+            <a:pPr marL="274320" lvl="1" indent="0">
+              <a:buNone/>
+            </a:pPr>
+            <a:endParaRPr lang="en-US" dirty="0">
+              <a:solidFill>
+                <a:srgbClr val="008000"/>
+              </a:solidFill>
+              <a:latin typeface="SFMono-Regular"/>
+            </a:endParaRPr>
+          </a:p>
+          <a:p>
+            <a:pPr marL="274320" lvl="1" indent="0">
+              <a:buNone/>
+            </a:pPr>
+            <a:r>
+              <a:rPr lang="en-US" dirty="0"/>
+              <a:t>MSDN Documentation:</a:t>
+            </a:r>
+            <a:r>
+              <a:rPr lang="en-US" dirty="0">
+                <a:solidFill>
+                  <a:srgbClr val="008000"/>
+                </a:solidFill>
+                <a:latin typeface="SFMono-Regular"/>
+              </a:rPr>
+              <a:t> </a:t>
+            </a:r>
+            <a:r>
+              <a:rPr lang="en-US" dirty="0">
+                <a:hlinkClick r:id="rId2"/>
+              </a:rPr>
+              <a:t>https://docs.microsoft.com/en-us/dotnet/csharp/language-reference/builtin-types/nullable-value-types</a:t>
+            </a:r>
+            <a:endParaRPr lang="en-US" dirty="0"/>
+          </a:p>
+        </p:txBody>
+      </p:sp>
+    </p:spTree>
+    <p:extLst>
+      <p:ext uri="{BB962C8B-B14F-4D97-AF65-F5344CB8AC3E}">
+        <p14:creationId xmlns:p14="http://schemas.microsoft.com/office/powerpoint/2010/main" val="2681204170"/>
+      </p:ext>
+    </p:extLst>
+  </p:cSld>
+  <p:clrMapOvr>
+    <a:masterClrMapping/>
+  </p:clrMapOvr>
+</p:sld>
+</file>
+
+<file path=ppt/slides/slide5.xml><?xml version="1.0" encoding="utf-8"?>
+<p:sld xmlns:a="http://schemas.openxmlformats.org/drawingml/2006/main" xmlns:r="http://schemas.openxmlformats.org/officeDocument/2006/relationships" xmlns:p="http://schemas.openxmlformats.org/presentationml/2006/main">
+  <p:cSld>
+    <p:spTree>
+      <p:nvGrpSpPr>
+        <p:cNvPr id="1" name=""/>
+        <p:cNvGrpSpPr/>
+        <p:nvPr/>
+      </p:nvGrpSpPr>
+      <p:grpSpPr>
+        <a:xfrm>
+          <a:off x="0" y="0"/>
+          <a:ext cx="0" cy="0"/>
+          <a:chOff x="0" y="0"/>
+          <a:chExt cx="0" cy="0"/>
+        </a:xfrm>
+      </p:grpSpPr>
+      <p:sp>
+        <p:nvSpPr>
+          <p:cNvPr id="2" name="Title 1">
+            <a:extLst>
+              <a:ext uri="{FF2B5EF4-FFF2-40B4-BE49-F238E27FC236}">
+                <a16:creationId xmlns:a16="http://schemas.microsoft.com/office/drawing/2014/main" id="{7833FD6B-B85A-40C6-987E-2A7C562E0DFB}"/>
+              </a:ext>
+            </a:extLst>
+          </p:cNvPr>
+          <p:cNvSpPr>
+            <a:spLocks noGrp="1"/>
+          </p:cNvSpPr>
+          <p:nvPr>
+            <p:ph type="title"/>
+          </p:nvPr>
+        </p:nvSpPr>
+        <p:spPr/>
+        <p:txBody>
+          <a:bodyPr/>
+          <a:lstStyle/>
+          <a:p>
+            <a:r>
+              <a:rPr lang="en-US" dirty="0"/>
+              <a:t>What is a nullable reference type?</a:t>
+            </a:r>
+          </a:p>
+        </p:txBody>
+      </p:sp>
+      <p:sp>
+        <p:nvSpPr>
+          <p:cNvPr id="3" name="Content Placeholder 2">
+            <a:extLst>
+              <a:ext uri="{FF2B5EF4-FFF2-40B4-BE49-F238E27FC236}">
+                <a16:creationId xmlns:a16="http://schemas.microsoft.com/office/drawing/2014/main" id="{8D63D492-7BE7-4E60-B0C3-BD370D7C66BD}"/>
+              </a:ext>
+            </a:extLst>
+          </p:cNvPr>
+          <p:cNvSpPr>
+            <a:spLocks noGrp="1"/>
+          </p:cNvSpPr>
+          <p:nvPr>
+            <p:ph idx="1"/>
+          </p:nvPr>
+        </p:nvSpPr>
+        <p:spPr/>
+        <p:txBody>
+          <a:bodyPr/>
+          <a:lstStyle/>
+          <a:p>
+            <a:r>
+              <a:rPr lang="en-US" sz="1800" kern="1200" dirty="0">
+                <a:solidFill>
+                  <a:srgbClr val="000000"/>
+                </a:solidFill>
+                <a:effectLst/>
+                <a:latin typeface="Garamond" panose="02020404030301010803" pitchFamily="18" charset="0"/>
+                <a:ea typeface="+mn-ea"/>
+                <a:cs typeface="+mn-cs"/>
+              </a:rPr>
+              <a:t>Available beginning in C# 8.0 when you opt into nullable aware context using build settings.</a:t>
+            </a:r>
+          </a:p>
+          <a:p>
+            <a:endParaRPr lang="en-US" sz="1800" kern="1200" dirty="0">
+              <a:solidFill>
+                <a:srgbClr val="000000"/>
+              </a:solidFill>
+              <a:effectLst/>
+              <a:latin typeface="Garamond" panose="02020404030301010803" pitchFamily="18" charset="0"/>
+              <a:ea typeface="+mn-ea"/>
+              <a:cs typeface="+mn-cs"/>
+            </a:endParaRPr>
+          </a:p>
+          <a:p>
+            <a:r>
+              <a:rPr lang="en-US" sz="1800" kern="1200" dirty="0">
+                <a:solidFill>
+                  <a:srgbClr val="000000"/>
+                </a:solidFill>
+                <a:effectLst/>
+                <a:latin typeface="Garamond" panose="02020404030301010803" pitchFamily="18" charset="0"/>
+                <a:ea typeface="+mn-ea"/>
+                <a:cs typeface="+mn-cs"/>
+              </a:rPr>
+              <a:t>MSDN Documentation</a:t>
+            </a:r>
+            <a:r>
+              <a:rPr lang="en-US" sz="1800" kern="1200" dirty="0">
+                <a:solidFill>
+                  <a:srgbClr val="000000"/>
+                </a:solidFill>
+                <a:effectLst/>
+                <a:latin typeface="Garamond" panose="02020404030301010803" pitchFamily="18" charset="0"/>
+                <a:hlinkClick r:id="rId2"/>
+              </a:rPr>
+              <a:t>: </a:t>
+            </a:r>
+            <a:r>
+              <a:rPr lang="en-US" dirty="0">
+                <a:hlinkClick r:id="rId2"/>
+              </a:rPr>
+              <a:t>https://docs.microsoft.com/en-us/dotnet/csharp/language-reference/builtin-types/nullable-reference-types</a:t>
+            </a:r>
+            <a:endParaRPr lang="en-US" dirty="0"/>
+          </a:p>
+        </p:txBody>
+      </p:sp>
+    </p:spTree>
+    <p:extLst>
+      <p:ext uri="{BB962C8B-B14F-4D97-AF65-F5344CB8AC3E}">
+        <p14:creationId xmlns:p14="http://schemas.microsoft.com/office/powerpoint/2010/main" val="1761299376"/>
+      </p:ext>
+    </p:extLst>
+  </p:cSld>
+  <p:clrMapOvr>
+    <a:masterClrMapping/>
+  </p:clrMapOvr>
+</p:sld>
+</file>
+
+<file path=ppt/slides/slide6.xml><?xml version="1.0" encoding="utf-8"?>
+<p:sld xmlns:a="http://schemas.openxmlformats.org/drawingml/2006/main" xmlns:r="http://schemas.openxmlformats.org/officeDocument/2006/relationships" xmlns:p="http://schemas.openxmlformats.org/presentationml/2006/main">
+  <p:cSld>
+    <p:spTree>
+      <p:nvGrpSpPr>
+        <p:cNvPr id="1" name=""/>
+        <p:cNvGrpSpPr/>
+        <p:nvPr/>
+      </p:nvGrpSpPr>
+      <p:grpSpPr>
+        <a:xfrm>
+          <a:off x="0" y="0"/>
+          <a:ext cx="0" cy="0"/>
+          <a:chOff x="0" y="0"/>
+          <a:chExt cx="0" cy="0"/>
+        </a:xfrm>
+      </p:grpSpPr>
+      <p:sp>
+        <p:nvSpPr>
+          <p:cNvPr id="2" name="Title 1">
+            <a:extLst>
+              <a:ext uri="{FF2B5EF4-FFF2-40B4-BE49-F238E27FC236}">
+                <a16:creationId xmlns:a16="http://schemas.microsoft.com/office/drawing/2014/main" id="{7833FD6B-B85A-40C6-987E-2A7C562E0DFB}"/>
+              </a:ext>
+            </a:extLst>
+          </p:cNvPr>
+          <p:cNvSpPr>
+            <a:spLocks noGrp="1"/>
+          </p:cNvSpPr>
+          <p:nvPr>
+            <p:ph type="title"/>
+          </p:nvPr>
+        </p:nvSpPr>
+        <p:spPr/>
+        <p:txBody>
+          <a:bodyPr/>
+          <a:lstStyle/>
+          <a:p>
+            <a:r>
+              <a:rPr lang="en-US" dirty="0"/>
+              <a:t>Nullable reference type?</a:t>
+            </a:r>
+          </a:p>
+        </p:txBody>
+      </p:sp>
+      <p:sp>
+        <p:nvSpPr>
+          <p:cNvPr id="3" name="Content Placeholder 2">
+            <a:extLst>
+              <a:ext uri="{FF2B5EF4-FFF2-40B4-BE49-F238E27FC236}">
+                <a16:creationId xmlns:a16="http://schemas.microsoft.com/office/drawing/2014/main" id="{8D63D492-7BE7-4E60-B0C3-BD370D7C66BD}"/>
+              </a:ext>
+            </a:extLst>
+          </p:cNvPr>
+          <p:cNvSpPr>
+            <a:spLocks noGrp="1"/>
+          </p:cNvSpPr>
+          <p:nvPr>
+            <p:ph idx="1"/>
+          </p:nvPr>
+        </p:nvSpPr>
+        <p:spPr/>
+        <p:txBody>
+          <a:bodyPr/>
+          <a:lstStyle/>
+          <a:p>
+            <a:pPr marL="0" indent="0">
+              <a:buNone/>
+            </a:pPr>
+            <a:r>
+              <a:rPr lang="en-US" b="0" i="0" dirty="0">
+                <a:solidFill>
+                  <a:srgbClr val="0101FD"/>
+                </a:solidFill>
+                <a:effectLst/>
+                <a:latin typeface="SFMono-Regular"/>
+              </a:rPr>
+              <a:t>string</a:t>
+            </a:r>
+            <a:r>
+              <a:rPr lang="en-US" b="0" i="0" dirty="0">
+                <a:solidFill>
+                  <a:srgbClr val="171717"/>
+                </a:solidFill>
+                <a:effectLst/>
+                <a:latin typeface="SFMono-Regular"/>
+              </a:rPr>
+              <a:t> description = </a:t>
+            </a:r>
+            <a:r>
+              <a:rPr lang="en-US" b="0" i="0" dirty="0">
+                <a:solidFill>
+                  <a:srgbClr val="A31515"/>
+                </a:solidFill>
+                <a:effectLst/>
+                <a:latin typeface="SFMono-Regular"/>
+              </a:rPr>
+              <a:t>"widget"</a:t>
+            </a:r>
+            <a:r>
+              <a:rPr lang="en-US" b="0" i="0" dirty="0">
+                <a:solidFill>
+                  <a:srgbClr val="171717"/>
+                </a:solidFill>
+                <a:effectLst/>
+                <a:latin typeface="SFMono-Regular"/>
+              </a:rPr>
+              <a:t>; </a:t>
+            </a:r>
+          </a:p>
+          <a:p>
+            <a:pPr marL="0" indent="0">
+              <a:buNone/>
+            </a:pPr>
+            <a:r>
+              <a:rPr lang="en-US" b="0" i="0" dirty="0">
+                <a:solidFill>
+                  <a:srgbClr val="0101FD"/>
+                </a:solidFill>
+                <a:effectLst/>
+                <a:latin typeface="SFMono-Regular"/>
+              </a:rPr>
+              <a:t>var</a:t>
+            </a:r>
+            <a:r>
+              <a:rPr lang="en-US" b="0" i="0" dirty="0">
+                <a:solidFill>
+                  <a:srgbClr val="171717"/>
+                </a:solidFill>
+                <a:effectLst/>
+                <a:latin typeface="SFMono-Regular"/>
+              </a:rPr>
+              <a:t> item = </a:t>
+            </a:r>
+            <a:r>
+              <a:rPr lang="en-US" b="0" i="0" dirty="0">
+                <a:solidFill>
+                  <a:srgbClr val="0101FD"/>
+                </a:solidFill>
+                <a:effectLst/>
+                <a:latin typeface="SFMono-Regular"/>
+              </a:rPr>
+              <a:t>new</a:t>
+            </a:r>
+            <a:r>
+              <a:rPr lang="en-US" b="0" i="0" dirty="0">
+                <a:solidFill>
+                  <a:srgbClr val="171717"/>
+                </a:solidFill>
+                <a:effectLst/>
+                <a:latin typeface="SFMono-Regular"/>
+              </a:rPr>
+              <a:t> </a:t>
+            </a:r>
+            <a:r>
+              <a:rPr lang="en-US" b="0" i="0" dirty="0" err="1">
+                <a:solidFill>
+                  <a:srgbClr val="171717"/>
+                </a:solidFill>
+                <a:effectLst/>
+                <a:latin typeface="SFMono-Regular"/>
+              </a:rPr>
+              <a:t>ProductDescription</a:t>
+            </a:r>
+            <a:r>
+              <a:rPr lang="en-US" b="0" i="0" dirty="0">
+                <a:solidFill>
+                  <a:srgbClr val="171717"/>
+                </a:solidFill>
+                <a:effectLst/>
+                <a:latin typeface="SFMono-Regular"/>
+              </a:rPr>
+              <a:t>(description);</a:t>
+            </a:r>
+            <a:endParaRPr lang="en-US" b="0" i="0" dirty="0">
+              <a:solidFill>
+                <a:srgbClr val="0101FD"/>
+              </a:solidFill>
+              <a:effectLst/>
+              <a:latin typeface="SFMono-Regular"/>
+            </a:endParaRPr>
+          </a:p>
+          <a:p>
+            <a:pPr marL="0" indent="0">
+              <a:buNone/>
+            </a:pPr>
+            <a:r>
+              <a:rPr lang="en-US" b="0" i="0" dirty="0">
+                <a:solidFill>
+                  <a:srgbClr val="0101FD"/>
+                </a:solidFill>
+                <a:effectLst/>
+                <a:latin typeface="SFMono-Regular"/>
+              </a:rPr>
+              <a:t>string</a:t>
+            </a:r>
+            <a:r>
+              <a:rPr lang="en-US" b="0" i="0" dirty="0">
+                <a:solidFill>
+                  <a:srgbClr val="171717"/>
+                </a:solidFill>
+                <a:effectLst/>
+                <a:latin typeface="SFMono-Regular"/>
+              </a:rPr>
+              <a:t> </a:t>
+            </a:r>
+            <a:r>
+              <a:rPr lang="en-US" b="0" i="0" dirty="0" err="1">
+                <a:solidFill>
+                  <a:srgbClr val="171717"/>
+                </a:solidFill>
+                <a:effectLst/>
+                <a:latin typeface="SFMono-Regular"/>
+              </a:rPr>
+              <a:t>shortDescription</a:t>
+            </a:r>
+            <a:r>
+              <a:rPr lang="en-US" b="0" i="0" dirty="0">
+                <a:solidFill>
+                  <a:srgbClr val="171717"/>
+                </a:solidFill>
+                <a:effectLst/>
+                <a:latin typeface="SFMono-Regular"/>
+              </a:rPr>
+              <a:t> = </a:t>
+            </a:r>
+            <a:r>
+              <a:rPr lang="en-US" b="0" i="0" dirty="0">
+                <a:solidFill>
+                  <a:srgbClr val="0101FD"/>
+                </a:solidFill>
+                <a:effectLst/>
+                <a:latin typeface="SFMono-Regular"/>
+              </a:rPr>
+              <a:t>default</a:t>
+            </a:r>
+            <a:r>
+              <a:rPr lang="en-US" b="0" i="0" dirty="0">
+                <a:solidFill>
+                  <a:srgbClr val="171717"/>
+                </a:solidFill>
+                <a:effectLst/>
+                <a:latin typeface="SFMono-Regular"/>
+              </a:rPr>
+              <a:t>; </a:t>
+            </a:r>
+            <a:r>
+              <a:rPr lang="en-US" b="0" i="0" dirty="0">
+                <a:solidFill>
+                  <a:srgbClr val="008000"/>
+                </a:solidFill>
+                <a:effectLst/>
+                <a:latin typeface="SFMono-Regular"/>
+              </a:rPr>
+              <a:t>// Warning; non-nullable set to null;</a:t>
+            </a:r>
+            <a:r>
+              <a:rPr lang="en-US" b="0" i="0" dirty="0">
+                <a:solidFill>
+                  <a:srgbClr val="171717"/>
+                </a:solidFill>
+                <a:effectLst/>
+                <a:latin typeface="SFMono-Regular"/>
+              </a:rPr>
+              <a:t> </a:t>
+            </a:r>
+          </a:p>
+          <a:p>
+            <a:pPr marL="0" indent="0">
+              <a:buNone/>
+            </a:pPr>
+            <a:r>
+              <a:rPr lang="en-US" b="0" i="0" dirty="0">
+                <a:solidFill>
+                  <a:srgbClr val="0101FD"/>
+                </a:solidFill>
+                <a:effectLst/>
+                <a:latin typeface="SFMono-Regular"/>
+              </a:rPr>
+              <a:t>var</a:t>
+            </a:r>
+            <a:r>
+              <a:rPr lang="en-US" b="0" i="0" dirty="0">
+                <a:solidFill>
+                  <a:srgbClr val="171717"/>
+                </a:solidFill>
+                <a:effectLst/>
+                <a:latin typeface="SFMono-Regular"/>
+              </a:rPr>
+              <a:t> product = </a:t>
+            </a:r>
+            <a:r>
+              <a:rPr lang="en-US" b="0" i="0" dirty="0">
+                <a:solidFill>
+                  <a:srgbClr val="0101FD"/>
+                </a:solidFill>
+                <a:effectLst/>
+                <a:latin typeface="SFMono-Regular"/>
+              </a:rPr>
+              <a:t>new</a:t>
+            </a:r>
+            <a:r>
+              <a:rPr lang="en-US" b="0" i="0" dirty="0">
+                <a:solidFill>
+                  <a:srgbClr val="171717"/>
+                </a:solidFill>
+                <a:effectLst/>
+                <a:latin typeface="SFMono-Regular"/>
+              </a:rPr>
+              <a:t> </a:t>
+            </a:r>
+            <a:r>
+              <a:rPr lang="en-US" b="0" i="0" dirty="0" err="1">
+                <a:solidFill>
+                  <a:srgbClr val="171717"/>
+                </a:solidFill>
+                <a:effectLst/>
+                <a:latin typeface="SFMono-Regular"/>
+              </a:rPr>
+              <a:t>ProductDescription</a:t>
+            </a:r>
+            <a:r>
+              <a:rPr lang="en-US" b="0" i="0" dirty="0">
+                <a:solidFill>
+                  <a:srgbClr val="171717"/>
+                </a:solidFill>
+                <a:effectLst/>
+                <a:latin typeface="SFMono-Regular"/>
+              </a:rPr>
+              <a:t>(</a:t>
+            </a:r>
+            <a:r>
+              <a:rPr lang="en-US" b="0" i="0" dirty="0" err="1">
+                <a:solidFill>
+                  <a:srgbClr val="171717"/>
+                </a:solidFill>
+                <a:effectLst/>
+                <a:latin typeface="SFMono-Regular"/>
+              </a:rPr>
+              <a:t>shortDescription</a:t>
+            </a:r>
+            <a:r>
+              <a:rPr lang="en-US" b="0" i="0" dirty="0">
+                <a:solidFill>
+                  <a:srgbClr val="171717"/>
+                </a:solidFill>
+                <a:effectLst/>
+                <a:latin typeface="SFMono-Regular"/>
+              </a:rPr>
+              <a:t>); </a:t>
+            </a:r>
+            <a:r>
+              <a:rPr lang="en-US" b="0" i="0" dirty="0">
+                <a:solidFill>
+                  <a:srgbClr val="008000"/>
+                </a:solidFill>
+                <a:effectLst/>
+                <a:latin typeface="SFMono-Regular"/>
+              </a:rPr>
+              <a:t>// Warning; static analysis knows </a:t>
+            </a:r>
+            <a:r>
+              <a:rPr lang="en-US" b="0" i="0" dirty="0" err="1">
+                <a:solidFill>
+                  <a:srgbClr val="008000"/>
+                </a:solidFill>
+                <a:effectLst/>
+                <a:latin typeface="SFMono-Regular"/>
+              </a:rPr>
+              <a:t>shortDescription</a:t>
+            </a:r>
+            <a:r>
+              <a:rPr lang="en-US" b="0" i="0" dirty="0">
+                <a:solidFill>
+                  <a:srgbClr val="008000"/>
+                </a:solidFill>
+                <a:effectLst/>
+                <a:latin typeface="SFMono-Regular"/>
+              </a:rPr>
+              <a:t> maybe null.</a:t>
+            </a:r>
+            <a:r>
+              <a:rPr lang="en-US" b="0" i="0" dirty="0">
+                <a:solidFill>
+                  <a:srgbClr val="171717"/>
+                </a:solidFill>
+                <a:effectLst/>
+                <a:latin typeface="SFMono-Regular"/>
+              </a:rPr>
+              <a:t> </a:t>
+            </a:r>
+          </a:p>
+          <a:p>
+            <a:pPr marL="0" indent="0">
+              <a:buNone/>
+            </a:pPr>
+            <a:endParaRPr lang="en-US" dirty="0">
+              <a:solidFill>
+                <a:srgbClr val="000000"/>
+              </a:solidFill>
+              <a:latin typeface="Garamond" panose="02020404030301010803" pitchFamily="18" charset="0"/>
+            </a:endParaRPr>
+          </a:p>
+          <a:p>
+            <a:r>
+              <a:rPr lang="en-US" sz="1800" kern="1200" dirty="0">
+                <a:solidFill>
+                  <a:srgbClr val="000000"/>
+                </a:solidFill>
+                <a:effectLst/>
+                <a:latin typeface="Garamond" panose="02020404030301010803" pitchFamily="18" charset="0"/>
+                <a:ea typeface="+mn-ea"/>
+                <a:cs typeface="+mn-cs"/>
+              </a:rPr>
+              <a:t>MSDN Documentation</a:t>
+            </a:r>
+            <a:r>
+              <a:rPr lang="en-US" sz="1800" kern="1200" dirty="0">
+                <a:solidFill>
+                  <a:srgbClr val="000000"/>
+                </a:solidFill>
+                <a:effectLst/>
+                <a:latin typeface="Garamond" panose="02020404030301010803" pitchFamily="18" charset="0"/>
+                <a:hlinkClick r:id="rId2"/>
+              </a:rPr>
+              <a:t>: </a:t>
+            </a:r>
+            <a:r>
+              <a:rPr lang="en-US" dirty="0">
+                <a:hlinkClick r:id="rId2"/>
+              </a:rPr>
+              <a:t>https://docs.microsoft.com/en-us/dotnet/csharp/language-reference/builtin-types/nullable-reference-types</a:t>
+            </a:r>
+            <a:endParaRPr lang="en-US" dirty="0"/>
+          </a:p>
+        </p:txBody>
+      </p:sp>
+    </p:spTree>
+    <p:extLst>
+      <p:ext uri="{BB962C8B-B14F-4D97-AF65-F5344CB8AC3E}">
+        <p14:creationId xmlns:p14="http://schemas.microsoft.com/office/powerpoint/2010/main" val="3020810310"/>
+      </p:ext>
+    </p:extLst>
+  </p:cSld>
+  <p:clrMapOvr>
+    <a:masterClrMapping/>
+  </p:clrMapOvr>
+</p:sld>
+</file>
+
+<file path=ppt/slides/slide7.xml><?xml version="1.0" encoding="utf-8"?>
+<p:sld xmlns:a="http://schemas.openxmlformats.org/drawingml/2006/main" xmlns:r="http://schemas.openxmlformats.org/officeDocument/2006/relationships" xmlns:p="http://schemas.openxmlformats.org/presentationml/2006/main">
+  <p:cSld>
+    <p:spTree>
+      <p:nvGrpSpPr>
+        <p:cNvPr id="1" name=""/>
+        <p:cNvGrpSpPr/>
+        <p:nvPr/>
+      </p:nvGrpSpPr>
+      <p:grpSpPr>
+        <a:xfrm>
+          <a:off x="0" y="0"/>
+          <a:ext cx="0" cy="0"/>
+          <a:chOff x="0" y="0"/>
+          <a:chExt cx="0" cy="0"/>
+        </a:xfrm>
+      </p:grpSpPr>
+      <p:sp>
+        <p:nvSpPr>
+          <p:cNvPr id="2" name="Title 1">
+            <a:extLst>
+              <a:ext uri="{FF2B5EF4-FFF2-40B4-BE49-F238E27FC236}">
                 <a16:creationId xmlns:a16="http://schemas.microsoft.com/office/drawing/2014/main" id="{8E2484BB-30AE-49CF-B13F-24A81AC46484}"/>
               </a:ext>
             </a:extLst>
@@ -4913,8 +7076,8 @@
           <a:lstStyle/>
           <a:p>
             <a:r>
-              <a:rPr lang="en-US"/>
-              <a:t> </a:t>
+              <a:rPr lang="en-US" dirty="0"/>
+              <a:t> Syntax to know</a:t>
             </a:r>
           </a:p>
         </p:txBody>
@@ -4935,12 +7098,277 @@
             <p:ph idx="1"/>
           </p:nvPr>
         </p:nvSpPr>
-        <p:spPr/>
-        <p:txBody>
-          <a:bodyPr/>
+        <p:spPr>
+          <a:xfrm>
+            <a:off x="764275" y="2279176"/>
+            <a:ext cx="10360925" cy="3673568"/>
+          </a:xfrm>
+        </p:spPr>
+        <p:txBody>
+          <a:bodyPr>
+            <a:normAutofit/>
+          </a:bodyPr>
           <a:lstStyle/>
           <a:p>
-            <a:endParaRPr lang="en-US"/>
+            <a:pPr marL="0" indent="0">
+              <a:buNone/>
+            </a:pPr>
+            <a:r>
+              <a:rPr lang="en-US" b="0" i="0" dirty="0">
+                <a:solidFill>
+                  <a:srgbClr val="808080"/>
+                </a:solidFill>
+                <a:effectLst/>
+                <a:latin typeface="Consolas" panose="020B0609020204030204" pitchFamily="49" charset="0"/>
+              </a:rPr>
+              <a:t>#nullable enable</a:t>
+            </a:r>
+            <a:endParaRPr lang="en-US" b="0" i="0" dirty="0">
+              <a:solidFill>
+                <a:srgbClr val="0101FD"/>
+              </a:solidFill>
+              <a:effectLst/>
+              <a:latin typeface="SFMono-Regular"/>
+            </a:endParaRPr>
+          </a:p>
+          <a:p>
+            <a:pPr marL="0" indent="0">
+              <a:buNone/>
+            </a:pPr>
+            <a:r>
+              <a:rPr lang="en-US" b="0" i="0" dirty="0">
+                <a:solidFill>
+                  <a:srgbClr val="0101FD"/>
+                </a:solidFill>
+                <a:effectLst/>
+                <a:latin typeface="SFMono-Regular"/>
+              </a:rPr>
+              <a:t>string</a:t>
+            </a:r>
+            <a:r>
+              <a:rPr lang="en-US" b="0" i="0" dirty="0">
+                <a:solidFill>
+                  <a:srgbClr val="171717"/>
+                </a:solidFill>
+                <a:effectLst/>
+                <a:latin typeface="SFMono-Regular"/>
+              </a:rPr>
+              <a:t> </a:t>
+            </a:r>
+            <a:r>
+              <a:rPr lang="en-US" b="0" i="0" dirty="0" err="1">
+                <a:solidFill>
+                  <a:srgbClr val="171717"/>
+                </a:solidFill>
+                <a:effectLst/>
+                <a:latin typeface="SFMono-Regular"/>
+              </a:rPr>
+              <a:t>notNull</a:t>
+            </a:r>
+            <a:r>
+              <a:rPr lang="en-US" b="0" i="0" dirty="0">
+                <a:solidFill>
+                  <a:srgbClr val="171717"/>
+                </a:solidFill>
+                <a:effectLst/>
+                <a:latin typeface="SFMono-Regular"/>
+              </a:rPr>
+              <a:t> = </a:t>
+            </a:r>
+            <a:r>
+              <a:rPr lang="en-US" b="0" i="0" dirty="0">
+                <a:solidFill>
+                  <a:srgbClr val="A31515"/>
+                </a:solidFill>
+                <a:effectLst/>
+                <a:latin typeface="SFMono-Regular"/>
+              </a:rPr>
+              <a:t>"Hello"</a:t>
+            </a:r>
+            <a:r>
+              <a:rPr lang="en-US" b="0" i="0" dirty="0">
+                <a:solidFill>
+                  <a:srgbClr val="171717"/>
+                </a:solidFill>
+                <a:effectLst/>
+                <a:latin typeface="SFMono-Regular"/>
+              </a:rPr>
+              <a:t>; </a:t>
+            </a:r>
+          </a:p>
+          <a:p>
+            <a:pPr marL="0" indent="0">
+              <a:buNone/>
+            </a:pPr>
+            <a:r>
+              <a:rPr lang="en-US" b="0" i="0" dirty="0">
+                <a:solidFill>
+                  <a:srgbClr val="0101FD"/>
+                </a:solidFill>
+                <a:effectLst/>
+                <a:latin typeface="SFMono-Regular"/>
+              </a:rPr>
+              <a:t>string</a:t>
+            </a:r>
+            <a:r>
+              <a:rPr lang="en-US" b="0" i="0" dirty="0">
+                <a:solidFill>
+                  <a:srgbClr val="171717"/>
+                </a:solidFill>
+                <a:effectLst/>
+                <a:latin typeface="SFMono-Regular"/>
+              </a:rPr>
+              <a:t>? nullable = </a:t>
+            </a:r>
+            <a:r>
+              <a:rPr lang="en-US" b="0" i="0" dirty="0">
+                <a:solidFill>
+                  <a:srgbClr val="0101FD"/>
+                </a:solidFill>
+                <a:effectLst/>
+                <a:latin typeface="SFMono-Regular"/>
+              </a:rPr>
+              <a:t>default</a:t>
+            </a:r>
+            <a:r>
+              <a:rPr lang="en-US" b="0" i="0" dirty="0">
+                <a:solidFill>
+                  <a:srgbClr val="171717"/>
+                </a:solidFill>
+                <a:effectLst/>
+                <a:latin typeface="SFMono-Regular"/>
+              </a:rPr>
+              <a:t>; </a:t>
+            </a:r>
+          </a:p>
+          <a:p>
+            <a:pPr marL="0" indent="0">
+              <a:buNone/>
+            </a:pPr>
+            <a:r>
+              <a:rPr lang="en-US" b="0" i="0" dirty="0">
+                <a:solidFill>
+                  <a:srgbClr val="0101FD"/>
+                </a:solidFill>
+                <a:effectLst/>
+                <a:latin typeface="SFMono-Regular"/>
+              </a:rPr>
+              <a:t>string</a:t>
+            </a:r>
+            <a:r>
+              <a:rPr lang="en-US" b="0" i="0" dirty="0">
+                <a:solidFill>
+                  <a:srgbClr val="171717"/>
+                </a:solidFill>
+                <a:effectLst/>
+                <a:latin typeface="SFMono-Regular"/>
+              </a:rPr>
+              <a:t>? nullable2 = </a:t>
+            </a:r>
+            <a:r>
+              <a:rPr lang="en-US" b="0" i="0" dirty="0">
+                <a:solidFill>
+                  <a:srgbClr val="0101FD"/>
+                </a:solidFill>
+                <a:effectLst/>
+                <a:latin typeface="SFMono-Regular"/>
+              </a:rPr>
+              <a:t>null</a:t>
+            </a:r>
+            <a:r>
+              <a:rPr lang="en-US" b="0" i="0" dirty="0">
+                <a:solidFill>
+                  <a:srgbClr val="171717"/>
+                </a:solidFill>
+                <a:effectLst/>
+                <a:latin typeface="SFMono-Regular"/>
+              </a:rPr>
+              <a:t>; </a:t>
+            </a:r>
+          </a:p>
+          <a:p>
+            <a:pPr marL="0" indent="0">
+              <a:buNone/>
+            </a:pPr>
+            <a:r>
+              <a:rPr lang="en-US" b="0" i="0" dirty="0" err="1">
+                <a:solidFill>
+                  <a:srgbClr val="171717"/>
+                </a:solidFill>
+                <a:effectLst/>
+                <a:latin typeface="SFMono-Regular"/>
+              </a:rPr>
+              <a:t>notNull</a:t>
+            </a:r>
+            <a:r>
+              <a:rPr lang="en-US" b="0" i="0" dirty="0">
+                <a:solidFill>
+                  <a:srgbClr val="171717"/>
+                </a:solidFill>
+                <a:effectLst/>
+                <a:latin typeface="SFMono-Regular"/>
+              </a:rPr>
+              <a:t> = nullable!; </a:t>
+            </a:r>
+            <a:r>
+              <a:rPr lang="en-US" b="0" i="0" dirty="0">
+                <a:solidFill>
+                  <a:srgbClr val="008000"/>
+                </a:solidFill>
+                <a:effectLst/>
+                <a:latin typeface="SFMono-Regular"/>
+              </a:rPr>
+              <a:t>// null forgiving </a:t>
+            </a:r>
+            <a:r>
+              <a:rPr lang="en-US" dirty="0">
+                <a:solidFill>
+                  <a:srgbClr val="008000"/>
+                </a:solidFill>
+                <a:latin typeface="SFMono-Regular"/>
+              </a:rPr>
+              <a:t>operator (</a:t>
+            </a:r>
+            <a:r>
+              <a:rPr lang="en-US" b="0" i="0" dirty="0">
+                <a:solidFill>
+                  <a:srgbClr val="008000"/>
+                </a:solidFill>
+                <a:effectLst/>
+                <a:latin typeface="SFMono-Regular"/>
+              </a:rPr>
+              <a:t>Should be avoided)</a:t>
+            </a:r>
+          </a:p>
+          <a:p>
+            <a:pPr marL="0" indent="0">
+              <a:buNone/>
+            </a:pPr>
+            <a:r>
+              <a:rPr lang="en-US" dirty="0">
+                <a:solidFill>
+                  <a:srgbClr val="008000"/>
+                </a:solidFill>
+                <a:latin typeface="SFMono-Regular"/>
+              </a:rPr>
+              <a:t>// It only turns off compiler checks at runtime even when the value may still be null, so only should be used in a rare case when the compiler is not able to detect that a nullable value is actually non-nullable</a:t>
+            </a:r>
+          </a:p>
+          <a:p>
+            <a:pPr marL="0" indent="0">
+              <a:buNone/>
+            </a:pPr>
+            <a:r>
+              <a:rPr lang="en-US" b="0" i="0" dirty="0">
+                <a:solidFill>
+                  <a:srgbClr val="808080"/>
+                </a:solidFill>
+                <a:effectLst/>
+                <a:latin typeface="Consolas" panose="020B0609020204030204" pitchFamily="49" charset="0"/>
+              </a:rPr>
+              <a:t>#nullable restore</a:t>
+            </a:r>
+            <a:endParaRPr lang="en-US" dirty="0"/>
           </a:p>
         </p:txBody>
       </p:sp>
@@ -4948,6 +7376,360 @@
     <p:extLst>
       <p:ext uri="{BB962C8B-B14F-4D97-AF65-F5344CB8AC3E}">
         <p14:creationId xmlns:p14="http://schemas.microsoft.com/office/powerpoint/2010/main" val="3268341817"/>
+      </p:ext>
+    </p:extLst>
+  </p:cSld>
+  <p:clrMapOvr>
+    <a:masterClrMapping/>
+  </p:clrMapOvr>
+</p:sld>
+</file>
+
+<file path=ppt/slides/slide8.xml><?xml version="1.0" encoding="utf-8"?>
+<p:sld xmlns:a="http://schemas.openxmlformats.org/drawingml/2006/main" xmlns:r="http://schemas.openxmlformats.org/officeDocument/2006/relationships" xmlns:p="http://schemas.openxmlformats.org/presentationml/2006/main">
+  <p:cSld>
+    <p:spTree>
+      <p:nvGrpSpPr>
+        <p:cNvPr id="1" name=""/>
+        <p:cNvGrpSpPr/>
+        <p:nvPr/>
+      </p:nvGrpSpPr>
+      <p:grpSpPr>
+        <a:xfrm>
+          <a:off x="0" y="0"/>
+          <a:ext cx="0" cy="0"/>
+          <a:chOff x="0" y="0"/>
+          <a:chExt cx="0" cy="0"/>
+        </a:xfrm>
+      </p:grpSpPr>
+      <p:sp>
+        <p:nvSpPr>
+          <p:cNvPr id="2" name="Title 1">
+            <a:extLst>
+              <a:ext uri="{FF2B5EF4-FFF2-40B4-BE49-F238E27FC236}">
+                <a16:creationId xmlns:a16="http://schemas.microsoft.com/office/drawing/2014/main" id="{8E2484BB-30AE-49CF-B13F-24A81AC46484}"/>
+              </a:ext>
+            </a:extLst>
+          </p:cNvPr>
+          <p:cNvSpPr>
+            <a:spLocks noGrp="1"/>
+          </p:cNvSpPr>
+          <p:nvPr>
+            <p:ph type="title"/>
+          </p:nvPr>
+        </p:nvSpPr>
+        <p:spPr/>
+        <p:txBody>
+          <a:bodyPr/>
+          <a:lstStyle/>
+          <a:p>
+            <a:r>
+              <a:rPr lang="en-US" dirty="0"/>
+              <a:t> Syntax to know</a:t>
+            </a:r>
+          </a:p>
+        </p:txBody>
+      </p:sp>
+      <p:sp>
+        <p:nvSpPr>
+          <p:cNvPr id="3" name="Content Placeholder 2">
+            <a:extLst>
+              <a:ext uri="{FF2B5EF4-FFF2-40B4-BE49-F238E27FC236}">
+                <a16:creationId xmlns:a16="http://schemas.microsoft.com/office/drawing/2014/main" id="{5E6087FD-A9F0-437C-982C-0DE663F327A0}"/>
+              </a:ext>
+            </a:extLst>
+          </p:cNvPr>
+          <p:cNvSpPr>
+            <a:spLocks noGrp="1"/>
+          </p:cNvSpPr>
+          <p:nvPr>
+            <p:ph idx="1"/>
+          </p:nvPr>
+        </p:nvSpPr>
+        <p:spPr>
+          <a:xfrm>
+            <a:off x="764275" y="2279176"/>
+            <a:ext cx="10360925" cy="3673568"/>
+          </a:xfrm>
+        </p:spPr>
+        <p:txBody>
+          <a:bodyPr>
+            <a:normAutofit/>
+          </a:bodyPr>
+          <a:lstStyle/>
+          <a:p>
+            <a:pPr marL="0" indent="0" algn="l">
+              <a:buNone/>
+            </a:pPr>
+            <a:r>
+              <a:rPr lang="en-US" dirty="0"/>
+              <a:t>Nullable context is set in </a:t>
+            </a:r>
+            <a:r>
+              <a:rPr lang="en-US" dirty="0" err="1"/>
+              <a:t>csproj</a:t>
+            </a:r>
+            <a:r>
+              <a:rPr lang="en-US" dirty="0"/>
+              <a:t> file as follows</a:t>
+            </a:r>
+            <a:endParaRPr lang="fr-FR" dirty="0"/>
+          </a:p>
+          <a:p>
+            <a:pPr marL="0" indent="0" algn="l">
+              <a:buNone/>
+            </a:pPr>
+            <a:r>
+              <a:rPr lang="fr-FR" dirty="0"/>
+              <a:t>&lt;</a:t>
+            </a:r>
+            <a:r>
+              <a:rPr lang="fr-FR" dirty="0" err="1"/>
+              <a:t>LangVersion</a:t>
+            </a:r>
+            <a:r>
+              <a:rPr lang="fr-FR" dirty="0"/>
+              <a:t>&gt;8.0&lt;/</a:t>
+            </a:r>
+            <a:r>
+              <a:rPr lang="fr-FR" dirty="0" err="1"/>
+              <a:t>LangVersion</a:t>
+            </a:r>
+            <a:r>
+              <a:rPr lang="fr-FR" dirty="0"/>
+              <a:t>&gt;  </a:t>
+            </a:r>
+          </a:p>
+          <a:p>
+            <a:pPr marL="0" indent="0" algn="l">
+              <a:buNone/>
+            </a:pPr>
+            <a:r>
+              <a:rPr lang="fr-FR" dirty="0"/>
+              <a:t>&lt;</a:t>
+            </a:r>
+            <a:r>
+              <a:rPr lang="fr-FR" dirty="0" err="1"/>
+              <a:t>Nullable</a:t>
+            </a:r>
+            <a:r>
+              <a:rPr lang="fr-FR" dirty="0"/>
+              <a:t>&gt;enable&lt;/</a:t>
+            </a:r>
+            <a:r>
+              <a:rPr lang="fr-FR" dirty="0" err="1"/>
+              <a:t>Nullable</a:t>
+            </a:r>
+            <a:r>
+              <a:rPr lang="fr-FR" dirty="0"/>
+              <a:t>&gt; </a:t>
+            </a:r>
+          </a:p>
+          <a:p>
+            <a:pPr marL="0" indent="0" algn="l">
+              <a:buNone/>
+            </a:pPr>
+            <a:endParaRPr lang="fr-FR" dirty="0"/>
+          </a:p>
+          <a:p>
+            <a:pPr marL="0" indent="0" algn="l">
+              <a:buNone/>
+            </a:pPr>
+            <a:r>
+              <a:rPr lang="fr-FR" dirty="0"/>
+              <a:t>Or in the source code </a:t>
+            </a:r>
+            <a:r>
+              <a:rPr lang="fr-FR" dirty="0" err="1"/>
+              <a:t>with</a:t>
+            </a:r>
+            <a:endParaRPr lang="fr-FR" dirty="0"/>
+          </a:p>
+          <a:p>
+            <a:pPr marL="0" indent="0" algn="l">
+              <a:buNone/>
+            </a:pPr>
+            <a:r>
+              <a:rPr lang="en-US" b="0" i="0" dirty="0">
+                <a:solidFill>
+                  <a:srgbClr val="808080"/>
+                </a:solidFill>
+                <a:effectLst/>
+                <a:latin typeface="Consolas" panose="020B0609020204030204" pitchFamily="49" charset="0"/>
+              </a:rPr>
+              <a:t>#nullable enable</a:t>
+            </a:r>
+            <a:r>
+              <a:rPr lang="en-US" b="0" i="0" dirty="0">
+                <a:solidFill>
+                  <a:srgbClr val="000000"/>
+                </a:solidFill>
+                <a:effectLst/>
+                <a:latin typeface="Consolas" panose="020B0609020204030204" pitchFamily="49" charset="0"/>
+              </a:rPr>
+              <a:t> </a:t>
+            </a:r>
+            <a:endParaRPr lang="fr-FR" b="0" i="0" dirty="0">
+              <a:solidFill>
+                <a:srgbClr val="000000"/>
+              </a:solidFill>
+              <a:effectLst/>
+              <a:latin typeface="Consolas" panose="020B0609020204030204" pitchFamily="49" charset="0"/>
+            </a:endParaRPr>
+          </a:p>
+          <a:p>
+            <a:pPr marL="0" indent="0" algn="l">
+              <a:buNone/>
+            </a:pPr>
+            <a:r>
+              <a:rPr lang="en-US" b="0" i="0" dirty="0">
+                <a:solidFill>
+                  <a:srgbClr val="808080"/>
+                </a:solidFill>
+                <a:effectLst/>
+                <a:latin typeface="Consolas" panose="020B0609020204030204" pitchFamily="49" charset="0"/>
+              </a:rPr>
+              <a:t>#nullable restore</a:t>
+            </a:r>
+            <a:r>
+              <a:rPr lang="en-US" b="0" i="0" dirty="0">
+                <a:solidFill>
+                  <a:srgbClr val="000000"/>
+                </a:solidFill>
+                <a:effectLst/>
+                <a:latin typeface="Consolas" panose="020B0609020204030204" pitchFamily="49" charset="0"/>
+              </a:rPr>
+              <a:t> </a:t>
+            </a:r>
+            <a:endParaRPr lang="fr-FR" dirty="0"/>
+          </a:p>
+        </p:txBody>
+      </p:sp>
+    </p:spTree>
+    <p:extLst>
+      <p:ext uri="{BB962C8B-B14F-4D97-AF65-F5344CB8AC3E}">
+        <p14:creationId xmlns:p14="http://schemas.microsoft.com/office/powerpoint/2010/main" val="2739618691"/>
+      </p:ext>
+    </p:extLst>
+  </p:cSld>
+  <p:clrMapOvr>
+    <a:masterClrMapping/>
+  </p:clrMapOvr>
+</p:sld>
+</file>
+
+<file path=ppt/slides/slide9.xml><?xml version="1.0" encoding="utf-8"?>
+<p:sld xmlns:a="http://schemas.openxmlformats.org/drawingml/2006/main" xmlns:r="http://schemas.openxmlformats.org/officeDocument/2006/relationships" xmlns:p="http://schemas.openxmlformats.org/presentationml/2006/main">
+  <p:cSld>
+    <p:spTree>
+      <p:nvGrpSpPr>
+        <p:cNvPr id="1" name=""/>
+        <p:cNvGrpSpPr/>
+        <p:nvPr/>
+      </p:nvGrpSpPr>
+      <p:grpSpPr>
+        <a:xfrm>
+          <a:off x="0" y="0"/>
+          <a:ext cx="0" cy="0"/>
+          <a:chOff x="0" y="0"/>
+          <a:chExt cx="0" cy="0"/>
+        </a:xfrm>
+      </p:grpSpPr>
+      <p:sp>
+        <p:nvSpPr>
+          <p:cNvPr id="2" name="Title 1">
+            <a:extLst>
+              <a:ext uri="{FF2B5EF4-FFF2-40B4-BE49-F238E27FC236}">
+                <a16:creationId xmlns:a16="http://schemas.microsoft.com/office/drawing/2014/main" id="{8E2484BB-30AE-49CF-B13F-24A81AC46484}"/>
+              </a:ext>
+            </a:extLst>
+          </p:cNvPr>
+          <p:cNvSpPr>
+            <a:spLocks noGrp="1"/>
+          </p:cNvSpPr>
+          <p:nvPr>
+            <p:ph type="title"/>
+          </p:nvPr>
+        </p:nvSpPr>
+        <p:spPr/>
+        <p:txBody>
+          <a:bodyPr/>
+          <a:lstStyle/>
+          <a:p>
+            <a:r>
+              <a:rPr lang="en-US" dirty="0"/>
+              <a:t> Syntax to know</a:t>
+            </a:r>
+          </a:p>
+        </p:txBody>
+      </p:sp>
+      <p:sp>
+        <p:nvSpPr>
+          <p:cNvPr id="3" name="Content Placeholder 2">
+            <a:extLst>
+              <a:ext uri="{FF2B5EF4-FFF2-40B4-BE49-F238E27FC236}">
+                <a16:creationId xmlns:a16="http://schemas.microsoft.com/office/drawing/2014/main" id="{5E6087FD-A9F0-437C-982C-0DE663F327A0}"/>
+              </a:ext>
+            </a:extLst>
+          </p:cNvPr>
+          <p:cNvSpPr>
+            <a:spLocks noGrp="1"/>
+          </p:cNvSpPr>
+          <p:nvPr>
+            <p:ph idx="1"/>
+          </p:nvPr>
+        </p:nvSpPr>
+        <p:spPr>
+          <a:xfrm>
+            <a:off x="764275" y="2279176"/>
+            <a:ext cx="10360925" cy="3673568"/>
+          </a:xfrm>
+        </p:spPr>
+        <p:txBody>
+          <a:bodyPr>
+            <a:normAutofit/>
+          </a:bodyPr>
+          <a:lstStyle/>
+          <a:p>
+            <a:r>
+              <a:rPr lang="en-US" sz="2000" dirty="0"/>
+              <a:t>Null Coalescing Assignment</a:t>
+            </a:r>
+          </a:p>
+          <a:p>
+            <a:pPr lvl="1"/>
+            <a:r>
+              <a:rPr lang="en-US" sz="1800" dirty="0"/>
+              <a:t>The null-coalescing operator ?? returns the value of its left-hand operand if it isn't null; otherwise, it evaluates the right-hand operand and returns its result.</a:t>
+            </a:r>
+          </a:p>
+          <a:p>
+            <a:pPr lvl="1"/>
+            <a:r>
+              <a:rPr lang="en-US" sz="1800" dirty="0"/>
+              <a:t>Support a??=b in place of if(a==null) a=b</a:t>
+            </a:r>
+          </a:p>
+          <a:p>
+            <a:pPr lvl="1"/>
+            <a:r>
+              <a:rPr lang="en-US" sz="1800" dirty="0"/>
+              <a:t>MSDN Documentation: </a:t>
+            </a:r>
+            <a:r>
+              <a:rPr lang="en-US" sz="1800" dirty="0">
+                <a:hlinkClick r:id="rId2"/>
+              </a:rPr>
+              <a:t>https://docs.microsoft.com/en-us/dotnet/csharp/language-reference/operators/null-coalescing-operator</a:t>
+            </a:r>
+            <a:endParaRPr lang="en-US" sz="1800" dirty="0"/>
+          </a:p>
+        </p:txBody>
+      </p:sp>
+    </p:spTree>
+    <p:extLst>
+      <p:ext uri="{BB962C8B-B14F-4D97-AF65-F5344CB8AC3E}">
+        <p14:creationId xmlns:p14="http://schemas.microsoft.com/office/powerpoint/2010/main" val="186704419"/>
       </p:ext>
     </p:extLst>
   </p:cSld>

</xml_diff>

<commit_message>
Add conditional operator notes
</commit_message>
<xml_diff>
--- a/Nullability and Pattern Matching.pptx
+++ b/Nullability and Pattern Matching.pptx
@@ -17,6 +17,7 @@
     <p:sldId id="265" r:id="rId11"/>
     <p:sldId id="266" r:id="rId12"/>
     <p:sldId id="267" r:id="rId13"/>
+    <p:sldId id="268" r:id="rId14"/>
   </p:sldIdLst>
   <p:sldSz cx="12192000" cy="6858000"/>
   <p:notesSz cx="6858000" cy="9144000"/>
@@ -126,7 +127,7 @@
 <file path=ppt/revisionInfo.xml><?xml version="1.0" encoding="utf-8"?>
 <p1510:revInfo xmlns:a="http://schemas.openxmlformats.org/drawingml/2006/main" xmlns:r="http://schemas.openxmlformats.org/officeDocument/2006/relationships" xmlns:p1510="http://schemas.microsoft.com/office/powerpoint/2015/10/main">
   <p1510:revLst>
-    <p1510:client id="{E9C26C98-DF0A-41A1-9F8C-982CDF906D42}" v="14" dt="2021-03-27T05:20:52.969"/>
+    <p1510:client id="{E9C26C98-DF0A-41A1-9F8C-982CDF906D42}" v="16" dt="2021-03-27T06:26:16.558"/>
   </p1510:revLst>
 </p1510:revInfo>
 </file>
@@ -136,7 +137,7 @@
   <pc:docChgLst>
     <pc:chgData name="Benjamin Michaelis" userId="047d050af9d747a3" providerId="LiveId" clId="{E9C26C98-DF0A-41A1-9F8C-982CDF906D42}"/>
     <pc:docChg chg="undo custSel addSld delSld modSld">
-      <pc:chgData name="Benjamin Michaelis" userId="047d050af9d747a3" providerId="LiveId" clId="{E9C26C98-DF0A-41A1-9F8C-982CDF906D42}" dt="2021-03-27T06:04:10.747" v="1582" actId="20577"/>
+      <pc:chgData name="Benjamin Michaelis" userId="047d050af9d747a3" providerId="LiveId" clId="{E9C26C98-DF0A-41A1-9F8C-982CDF906D42}" dt="2021-03-27T06:28:29.565" v="1845" actId="403"/>
       <pc:docMkLst>
         <pc:docMk/>
       </pc:docMkLst>
@@ -272,13 +273,13 @@
         </pc:spChg>
       </pc:sldChg>
       <pc:sldChg chg="modSp add mod">
-        <pc:chgData name="Benjamin Michaelis" userId="047d050af9d747a3" providerId="LiveId" clId="{E9C26C98-DF0A-41A1-9F8C-982CDF906D42}" dt="2021-03-27T05:24:16.708" v="1086" actId="403"/>
+        <pc:chgData name="Benjamin Michaelis" userId="047d050af9d747a3" providerId="LiveId" clId="{E9C26C98-DF0A-41A1-9F8C-982CDF906D42}" dt="2021-03-27T06:19:32.701" v="1589" actId="368"/>
         <pc:sldMkLst>
           <pc:docMk/>
           <pc:sldMk cId="186704419" sldId="261"/>
         </pc:sldMkLst>
         <pc:spChg chg="mod">
-          <ac:chgData name="Benjamin Michaelis" userId="047d050af9d747a3" providerId="LiveId" clId="{E9C26C98-DF0A-41A1-9F8C-982CDF906D42}" dt="2021-03-27T05:24:16.708" v="1086" actId="403"/>
+          <ac:chgData name="Benjamin Michaelis" userId="047d050af9d747a3" providerId="LiveId" clId="{E9C26C98-DF0A-41A1-9F8C-982CDF906D42}" dt="2021-03-27T06:19:32.701" v="1589" actId="368"/>
           <ac:spMkLst>
             <pc:docMk/>
             <pc:sldMk cId="186704419" sldId="261"/>
@@ -396,6 +397,21 @@
           <ac:spMkLst>
             <pc:docMk/>
             <pc:sldMk cId="1197133609" sldId="267"/>
+            <ac:spMk id="3" creationId="{37A151B1-D43B-4DEB-95F4-5213D7FD14E7}"/>
+          </ac:spMkLst>
+        </pc:spChg>
+      </pc:sldChg>
+      <pc:sldChg chg="modSp add mod">
+        <pc:chgData name="Benjamin Michaelis" userId="047d050af9d747a3" providerId="LiveId" clId="{E9C26C98-DF0A-41A1-9F8C-982CDF906D42}" dt="2021-03-27T06:28:29.565" v="1845" actId="403"/>
+        <pc:sldMkLst>
+          <pc:docMk/>
+          <pc:sldMk cId="2623555122" sldId="268"/>
+        </pc:sldMkLst>
+        <pc:spChg chg="mod">
+          <ac:chgData name="Benjamin Michaelis" userId="047d050af9d747a3" providerId="LiveId" clId="{E9C26C98-DF0A-41A1-9F8C-982CDF906D42}" dt="2021-03-27T06:28:29.565" v="1845" actId="403"/>
+          <ac:spMkLst>
+            <pc:docMk/>
+            <pc:sldMk cId="2623555122" sldId="268"/>
             <ac:spMk id="3" creationId="{37A151B1-D43B-4DEB-95F4-5213D7FD14E7}"/>
           </ac:spMkLst>
         </pc:spChg>
@@ -5877,6 +5893,201 @@
 </p:sld>
 </file>
 
+<file path=ppt/slides/slide13.xml><?xml version="1.0" encoding="utf-8"?>
+<p:sld xmlns:a="http://schemas.openxmlformats.org/drawingml/2006/main" xmlns:r="http://schemas.openxmlformats.org/officeDocument/2006/relationships" xmlns:p="http://schemas.openxmlformats.org/presentationml/2006/main">
+  <p:cSld>
+    <p:spTree>
+      <p:nvGrpSpPr>
+        <p:cNvPr id="1" name=""/>
+        <p:cNvGrpSpPr/>
+        <p:nvPr/>
+      </p:nvGrpSpPr>
+      <p:grpSpPr>
+        <a:xfrm>
+          <a:off x="0" y="0"/>
+          <a:ext cx="0" cy="0"/>
+          <a:chOff x="0" y="0"/>
+          <a:chExt cx="0" cy="0"/>
+        </a:xfrm>
+      </p:grpSpPr>
+      <p:sp>
+        <p:nvSpPr>
+          <p:cNvPr id="2" name="Title 1">
+            <a:extLst>
+              <a:ext uri="{FF2B5EF4-FFF2-40B4-BE49-F238E27FC236}">
+                <a16:creationId xmlns:a16="http://schemas.microsoft.com/office/drawing/2014/main" id="{C09132CF-994E-437A-ABB7-14B3F72673EF}"/>
+              </a:ext>
+            </a:extLst>
+          </p:cNvPr>
+          <p:cNvSpPr>
+            <a:spLocks noGrp="1"/>
+          </p:cNvSpPr>
+          <p:nvPr>
+            <p:ph type="title"/>
+          </p:nvPr>
+        </p:nvSpPr>
+        <p:spPr/>
+        <p:txBody>
+          <a:bodyPr/>
+          <a:lstStyle/>
+          <a:p>
+            <a:r>
+              <a:rPr lang="en-US" dirty="0"/>
+              <a:t>Intro to pattern matching examples</a:t>
+            </a:r>
+          </a:p>
+        </p:txBody>
+      </p:sp>
+      <p:sp>
+        <p:nvSpPr>
+          <p:cNvPr id="3" name="Content Placeholder 2">
+            <a:extLst>
+              <a:ext uri="{FF2B5EF4-FFF2-40B4-BE49-F238E27FC236}">
+                <a16:creationId xmlns:a16="http://schemas.microsoft.com/office/drawing/2014/main" id="{37A151B1-D43B-4DEB-95F4-5213D7FD14E7}"/>
+              </a:ext>
+            </a:extLst>
+          </p:cNvPr>
+          <p:cNvSpPr>
+            <a:spLocks noGrp="1"/>
+          </p:cNvSpPr>
+          <p:nvPr>
+            <p:ph idx="1"/>
+          </p:nvPr>
+        </p:nvSpPr>
+        <p:spPr/>
+        <p:txBody>
+          <a:bodyPr>
+            <a:normAutofit/>
+          </a:bodyPr>
+          <a:lstStyle/>
+          <a:p>
+            <a:r>
+              <a:rPr lang="en-US" sz="2000" dirty="0" err="1"/>
+              <a:t>condition_expression</a:t>
+            </a:r>
+            <a:r>
+              <a:rPr lang="en-US" sz="2000" dirty="0"/>
+              <a:t> ? </a:t>
+            </a:r>
+            <a:r>
+              <a:rPr lang="en-US" sz="2000" dirty="0" err="1"/>
+              <a:t>first_expression</a:t>
+            </a:r>
+            <a:r>
+              <a:rPr lang="en-US" sz="2000" dirty="0"/>
+              <a:t> : </a:t>
+            </a:r>
+            <a:r>
+              <a:rPr lang="en-US" sz="2000" dirty="0" err="1"/>
+              <a:t>second_expression</a:t>
+            </a:r>
+            <a:r>
+              <a:rPr lang="en-US" sz="2000" dirty="0"/>
+              <a:t>; </a:t>
+            </a:r>
+          </a:p>
+          <a:p>
+            <a:r>
+              <a:rPr lang="en-US" sz="2000" dirty="0"/>
+              <a:t>With conditional operator ?: if </a:t>
+            </a:r>
+            <a:r>
+              <a:rPr lang="en-US" sz="2000" dirty="0" err="1"/>
+              <a:t>condition_expression</a:t>
+            </a:r>
+            <a:r>
+              <a:rPr lang="en-US" sz="2000" dirty="0"/>
+              <a:t> is true then it will return first expression, else if false second expression will be returned</a:t>
+            </a:r>
+          </a:p>
+          <a:p>
+            <a:pPr lvl="1"/>
+            <a:r>
+              <a:rPr lang="en-US" sz="1800" dirty="0"/>
+              <a:t>is this condition true ? yes : no</a:t>
+            </a:r>
+          </a:p>
+          <a:p>
+            <a:pPr algn="l">
+              <a:buFont typeface="Arial" panose="020B0604020202020204" pitchFamily="34" charset="0"/>
+              <a:buChar char="•"/>
+            </a:pPr>
+            <a:endParaRPr lang="en-US" b="0" i="0" dirty="0">
+              <a:solidFill>
+                <a:srgbClr val="4E4E4E"/>
+              </a:solidFill>
+              <a:effectLst/>
+              <a:latin typeface="Segoe UI" panose="020B0502040204020203" pitchFamily="34" charset="0"/>
+            </a:endParaRPr>
+          </a:p>
+          <a:p>
+            <a:pPr algn="l">
+              <a:buFont typeface="Arial" panose="020B0604020202020204" pitchFamily="34" charset="0"/>
+              <a:buChar char="•"/>
+            </a:pPr>
+            <a:endParaRPr lang="en-US" dirty="0">
+              <a:solidFill>
+                <a:srgbClr val="4E4E4E"/>
+              </a:solidFill>
+              <a:latin typeface="Segoe UI" panose="020B0502040204020203" pitchFamily="34" charset="0"/>
+            </a:endParaRPr>
+          </a:p>
+          <a:p>
+            <a:pPr algn="l">
+              <a:buFont typeface="Arial" panose="020B0604020202020204" pitchFamily="34" charset="0"/>
+              <a:buChar char="•"/>
+            </a:pPr>
+            <a:endParaRPr lang="en-US" b="0" i="0" dirty="0">
+              <a:solidFill>
+                <a:srgbClr val="4E4E4E"/>
+              </a:solidFill>
+              <a:effectLst/>
+              <a:latin typeface="Segoe UI" panose="020B0502040204020203" pitchFamily="34" charset="0"/>
+            </a:endParaRPr>
+          </a:p>
+          <a:p>
+            <a:pPr marL="0" indent="0" algn="l">
+              <a:buNone/>
+            </a:pPr>
+            <a:r>
+              <a:rPr lang="en-US" dirty="0">
+                <a:solidFill>
+                  <a:srgbClr val="4E4E4E"/>
+                </a:solidFill>
+                <a:latin typeface="Segoe UI" panose="020B0502040204020203" pitchFamily="34" charset="0"/>
+              </a:rPr>
+              <a:t>MSDN Documentation: </a:t>
+            </a:r>
+            <a:r>
+              <a:rPr lang="en-US" dirty="0">
+                <a:solidFill>
+                  <a:srgbClr val="4E4E4E"/>
+                </a:solidFill>
+                <a:latin typeface="Segoe UI" panose="020B0502040204020203" pitchFamily="34" charset="0"/>
+                <a:hlinkClick r:id="rId2"/>
+              </a:rPr>
+              <a:t>https://docs.microsoft.com/en-us/dotnet/csharp/language-reference/operators/conditional-operator</a:t>
+            </a:r>
+            <a:endParaRPr lang="en-US" b="0" dirty="0">
+              <a:effectLst/>
+              <a:latin typeface="Consolas" panose="020B0609020204030204" pitchFamily="49" charset="0"/>
+            </a:endParaRPr>
+          </a:p>
+        </p:txBody>
+      </p:sp>
+    </p:spTree>
+    <p:extLst>
+      <p:ext uri="{BB962C8B-B14F-4D97-AF65-F5344CB8AC3E}">
+        <p14:creationId xmlns:p14="http://schemas.microsoft.com/office/powerpoint/2010/main" val="2623555122"/>
+      </p:ext>
+    </p:extLst>
+  </p:cSld>
+  <p:clrMapOvr>
+    <a:masterClrMapping/>
+  </p:clrMapOvr>
+</p:sld>
+</file>
+
 <file path=ppt/slides/slide2.xml><?xml version="1.0" encoding="utf-8"?>
 <p:sld xmlns:a="http://schemas.openxmlformats.org/drawingml/2006/main" xmlns:r="http://schemas.openxmlformats.org/officeDocument/2006/relationships" xmlns:p="http://schemas.openxmlformats.org/presentationml/2006/main">
   <p:cSld>
@@ -7723,6 +7934,12 @@
               <a:t>https://docs.microsoft.com/en-us/dotnet/csharp/language-reference/operators/null-coalescing-operator</a:t>
             </a:r>
             <a:endParaRPr lang="en-US" sz="1800" dirty="0"/>
+          </a:p>
+          <a:p>
+            <a:r>
+              <a:rPr lang="en-US" dirty="0"/>
+              <a:t>{ } is not null</a:t>
+            </a:r>
           </a:p>
         </p:txBody>
       </p:sp>

</xml_diff>